<commit_message>
Added another slide to the deck
</commit_message>
<xml_diff>
--- a/CTF-101 H4ck3r k1d3rgart3n.pptx
+++ b/CTF-101 H4ck3r k1d3rgart3n.pptx
@@ -30,6 +30,7 @@
     <p:sldId id="275" r:id="rId27"/>
     <p:sldId id="276" r:id="rId28"/>
     <p:sldId id="277" r:id="rId29"/>
+    <p:sldId id="278" r:id="rId30"/>
   </p:sldIdLst>
   <p:sldSz cx="13004800" cy="9753600"/>
   <p:notesSz cx="6858000" cy="9144000"/>
@@ -3762,7 +3763,7 @@
       </p:grpSpPr>
       <p:sp>
         <p:nvSpPr>
-          <p:cNvPr id="170" name="OSINT"/>
+          <p:cNvPr id="170" name="One more for fun"/>
           <p:cNvSpPr txBox="1"/>
           <p:nvPr>
             <p:ph type="title"/>
@@ -3779,35 +3780,14 @@
           <a:p>
             <a:pPr/>
             <a:r>
-              <a:t>OSINT</a:t>
-            </a:r>
-          </a:p>
-        </p:txBody>
-      </p:sp>
-      <p:sp>
-        <p:nvSpPr>
-          <p:cNvPr id="171" name="Body"/>
-          <p:cNvSpPr txBox="1"/>
-          <p:nvPr>
-            <p:ph type="body" idx="1"/>
-          </p:nvPr>
-        </p:nvSpPr>
-        <p:spPr>
-          <a:prstGeom prst="rect">
-            <a:avLst/>
-          </a:prstGeom>
-        </p:spPr>
-        <p:txBody>
-          <a:bodyPr/>
-          <a:lstStyle/>
-          <a:p>
-            <a:pPr/>
+              <a:t>One more for fun</a:t>
+            </a:r>
           </a:p>
         </p:txBody>
       </p:sp>
       <p:pic>
         <p:nvPicPr>
-          <p:cNvPr id="172" name="Image" descr="Image"/>
+          <p:cNvPr id="171" name="Image" descr="Image"/>
           <p:cNvPicPr>
             <a:picLocks noChangeAspect="1"/>
           </p:cNvPicPr>
@@ -3823,8 +3803,8 @@
         </p:blipFill>
         <p:spPr>
           <a:xfrm>
-            <a:off x="1308100" y="2679700"/>
-            <a:ext cx="10388600" cy="4394200"/>
+            <a:off x="1091148" y="3742507"/>
+            <a:ext cx="10822504" cy="2014373"/>
           </a:xfrm>
           <a:prstGeom prst="rect">
             <a:avLst/>
@@ -3954,7 +3934,7 @@
       </p:grpSpPr>
       <p:sp>
         <p:nvSpPr>
-          <p:cNvPr id="174" name="Title"/>
+          <p:cNvPr id="173" name="OSINT"/>
           <p:cNvSpPr txBox="1"/>
           <p:nvPr>
             <p:ph type="title"/>
@@ -3970,12 +3950,15 @@
           <a:lstStyle/>
           <a:p>
             <a:pPr/>
+            <a:r>
+              <a:t>OSINT</a:t>
+            </a:r>
           </a:p>
         </p:txBody>
       </p:sp>
       <p:sp>
         <p:nvSpPr>
-          <p:cNvPr id="175" name="Body"/>
+          <p:cNvPr id="174" name="Body"/>
           <p:cNvSpPr txBox="1"/>
           <p:nvPr>
             <p:ph type="body" idx="1"/>
@@ -3996,7 +3979,7 @@
       </p:sp>
       <p:pic>
         <p:nvPicPr>
-          <p:cNvPr id="176" name="Image" descr="Image"/>
+          <p:cNvPr id="175" name="Image" descr="Image"/>
           <p:cNvPicPr>
             <a:picLocks noChangeAspect="1"/>
           </p:cNvPicPr>
@@ -4012,8 +3995,8 @@
         </p:blipFill>
         <p:spPr>
           <a:xfrm>
-            <a:off x="685412" y="984250"/>
-            <a:ext cx="11887976" cy="9753600"/>
+            <a:off x="1308100" y="2679700"/>
+            <a:ext cx="10388600" cy="4394200"/>
           </a:xfrm>
           <a:prstGeom prst="rect">
             <a:avLst/>
@@ -4051,7 +4034,7 @@
       </p:grpSpPr>
       <p:sp>
         <p:nvSpPr>
-          <p:cNvPr id="178" name="Additional resources"/>
+          <p:cNvPr id="177" name="Title"/>
           <p:cNvSpPr txBox="1"/>
           <p:nvPr>
             <p:ph type="title"/>
@@ -4067,15 +4050,12 @@
           <a:lstStyle/>
           <a:p>
             <a:pPr/>
-            <a:r>
-              <a:t>Additional resources</a:t>
-            </a:r>
           </a:p>
         </p:txBody>
       </p:sp>
       <p:sp>
         <p:nvSpPr>
-          <p:cNvPr id="179" name="Youtube…"/>
+          <p:cNvPr id="178" name="Body"/>
           <p:cNvSpPr txBox="1"/>
           <p:nvPr>
             <p:ph type="body" idx="1"/>
@@ -4091,24 +4071,38 @@
           <a:lstStyle/>
           <a:p>
             <a:pPr/>
-            <a:r>
-              <a:t>Youtube</a:t>
-            </a:r>
-          </a:p>
-          <a:p>
-            <a:pPr/>
-            <a:r>
-              <a:t>Ian Coldwater </a:t>
-            </a:r>
-            <a:r>
-              <a:rPr u="sng">
-                <a:hlinkClick r:id="rId2" invalidUrl="" action="" tgtFrame="" tooltip="" history="1" highlightClick="0" endSnd="0"/>
-              </a:rPr>
-              <a:t>@IanColdwater</a:t>
-            </a:r>
           </a:p>
         </p:txBody>
       </p:sp>
+      <p:pic>
+        <p:nvPicPr>
+          <p:cNvPr id="179" name="Image" descr="Image"/>
+          <p:cNvPicPr>
+            <a:picLocks noChangeAspect="1"/>
+          </p:cNvPicPr>
+          <p:nvPr/>
+        </p:nvPicPr>
+        <p:blipFill>
+          <a:blip r:embed="rId2">
+            <a:extLst/>
+          </a:blip>
+          <a:stretch>
+            <a:fillRect/>
+          </a:stretch>
+        </p:blipFill>
+        <p:spPr>
+          <a:xfrm>
+            <a:off x="685412" y="984250"/>
+            <a:ext cx="11887976" cy="9753600"/>
+          </a:xfrm>
+          <a:prstGeom prst="rect">
+            <a:avLst/>
+          </a:prstGeom>
+          <a:ln w="12700">
+            <a:miter lim="400000"/>
+          </a:ln>
+        </p:spPr>
+      </p:pic>
     </p:spTree>
   </p:cSld>
   <p:clrMapOvr>
@@ -4137,7 +4131,93 @@
       </p:grpSpPr>
       <p:sp>
         <p:nvSpPr>
-          <p:cNvPr id="181" name="That’s all there is to it…"/>
+          <p:cNvPr id="181" name="Additional resources"/>
+          <p:cNvSpPr txBox="1"/>
+          <p:nvPr>
+            <p:ph type="title"/>
+          </p:nvPr>
+        </p:nvSpPr>
+        <p:spPr>
+          <a:prstGeom prst="rect">
+            <a:avLst/>
+          </a:prstGeom>
+        </p:spPr>
+        <p:txBody>
+          <a:bodyPr/>
+          <a:lstStyle/>
+          <a:p>
+            <a:pPr/>
+            <a:r>
+              <a:t>Additional resources</a:t>
+            </a:r>
+          </a:p>
+        </p:txBody>
+      </p:sp>
+      <p:sp>
+        <p:nvSpPr>
+          <p:cNvPr id="182" name="Youtube…"/>
+          <p:cNvSpPr txBox="1"/>
+          <p:nvPr>
+            <p:ph type="body" idx="1"/>
+          </p:nvPr>
+        </p:nvSpPr>
+        <p:spPr>
+          <a:prstGeom prst="rect">
+            <a:avLst/>
+          </a:prstGeom>
+        </p:spPr>
+        <p:txBody>
+          <a:bodyPr/>
+          <a:lstStyle/>
+          <a:p>
+            <a:pPr/>
+            <a:r>
+              <a:t>Youtube</a:t>
+            </a:r>
+          </a:p>
+          <a:p>
+            <a:pPr/>
+            <a:r>
+              <a:t>Ian Coldwater </a:t>
+            </a:r>
+            <a:r>
+              <a:rPr u="sng">
+                <a:hlinkClick r:id="rId2" invalidUrl="" action="" tgtFrame="" tooltip="" history="1" highlightClick="0" endSnd="0"/>
+              </a:rPr>
+              <a:t>@IanColdwater</a:t>
+            </a:r>
+          </a:p>
+        </p:txBody>
+      </p:sp>
+    </p:spTree>
+  </p:cSld>
+  <p:clrMapOvr>
+    <a:masterClrMapping/>
+  </p:clrMapOvr>
+  <p:transition xmlns:p14="http://schemas.microsoft.com/office/powerpoint/2010/main" spd="med" advClick="1"/>
+</p:sld>
+</file>
+
+<file path=ppt/slides/slide23.xml><?xml version="1.0" encoding="utf-8"?>
+<p:sld xmlns:a="http://schemas.openxmlformats.org/drawingml/2006/main" xmlns:r="http://schemas.openxmlformats.org/officeDocument/2006/relationships" xmlns:p="http://schemas.openxmlformats.org/presentationml/2006/main" xmlns:m="http://schemas.openxmlformats.org/officeDocument/2006/math" xmlns:a14="http://schemas.microsoft.com/office/drawing/2010/main" showMasterSp="1" showMasterPhAnim="1">
+  <p:cSld>
+    <p:spTree>
+      <p:nvGrpSpPr>
+        <p:cNvPr id="1" name=""/>
+        <p:cNvGrpSpPr/>
+        <p:nvPr/>
+      </p:nvGrpSpPr>
+      <p:grpSpPr>
+        <a:xfrm>
+          <a:off x="0" y="0"/>
+          <a:ext cx="0" cy="0"/>
+          <a:chOff x="0" y="0"/>
+          <a:chExt cx="0" cy="0"/>
+        </a:xfrm>
+      </p:grpSpPr>
+      <p:sp>
+        <p:nvSpPr>
+          <p:cNvPr id="184" name="That’s all there is to it…"/>
           <p:cNvSpPr txBox="1"/>
           <p:nvPr>
             <p:ph type="title"/>

</xml_diff>

<commit_message>
Added Stacy's info to the slide deck
Added a python decode example
</commit_message>
<xml_diff>
--- a/CTF-101 H4ck3r k1d3rgart3n.pptx
+++ b/CTF-101 H4ck3r k1d3rgart3n.pptx
@@ -32,6 +32,10 @@
     <p:sldId id="277" r:id="rId29"/>
     <p:sldId id="278" r:id="rId30"/>
     <p:sldId id="279" r:id="rId31"/>
+    <p:sldId id="280" r:id="rId32"/>
+    <p:sldId id="281" r:id="rId33"/>
+    <p:sldId id="282" r:id="rId34"/>
+    <p:sldId id="283" r:id="rId35"/>
   </p:sldIdLst>
   <p:sldSz cx="13004800" cy="9753600"/>
   <p:notesSz cx="6858000" cy="9144000"/>
@@ -3082,111 +3086,26 @@
           <a:chExt cx="0" cy="0"/>
         </a:xfrm>
       </p:grpSpPr>
-      <p:pic>
-        <p:nvPicPr>
-          <p:cNvPr id="144" name="Image" descr="Image"/>
-          <p:cNvPicPr>
-            <a:picLocks noChangeAspect="1"/>
-          </p:cNvPicPr>
-          <p:nvPr/>
-        </p:nvPicPr>
-        <p:blipFill>
-          <a:blip r:embed="rId2">
-            <a:extLst/>
-          </a:blip>
-          <a:stretch>
-            <a:fillRect/>
-          </a:stretch>
-        </p:blipFill>
-        <p:spPr>
-          <a:xfrm>
-            <a:off x="504727" y="1542167"/>
-            <a:ext cx="11995346" cy="5701248"/>
-          </a:xfrm>
-          <a:prstGeom prst="rect">
-            <a:avLst/>
-          </a:prstGeom>
-          <a:ln w="12700">
-            <a:miter lim="400000"/>
-          </a:ln>
-        </p:spPr>
-      </p:pic>
       <p:sp>
         <p:nvSpPr>
-          <p:cNvPr id="145" name="Line"/>
-          <p:cNvSpPr/>
-          <p:nvPr/>
+          <p:cNvPr id="145" name="Time to get started"/>
+          <p:cNvSpPr txBox="1"/>
+          <p:nvPr>
+            <p:ph type="title"/>
+          </p:nvPr>
         </p:nvSpPr>
         <p:spPr>
-          <a:xfrm flipV="1">
-            <a:off x="1392038" y="1862931"/>
-            <a:ext cx="1434556" cy="3923656"/>
-          </a:xfrm>
-          <a:prstGeom prst="line">
-            <a:avLst/>
-          </a:prstGeom>
-          <a:ln w="25400">
-            <a:solidFill>
-              <a:srgbClr val="000000"/>
-            </a:solidFill>
-            <a:miter lim="400000"/>
-            <a:tailEnd type="triangle"/>
-          </a:ln>
+          <a:prstGeom prst="rect">
+            <a:avLst/>
+          </a:prstGeom>
         </p:spPr>
         <p:txBody>
-          <a:bodyPr lIns="50800" tIns="50800" rIns="50800" bIns="50800" anchor="ctr"/>
+          <a:bodyPr/>
           <a:lstStyle/>
           <a:p>
-            <a:pPr>
-              <a:defRPr b="0" sz="2200">
-                <a:solidFill>
-                  <a:srgbClr val="FFFFFF"/>
-                </a:solidFill>
-                <a:latin typeface="+mn-lt"/>
-                <a:ea typeface="+mn-ea"/>
-                <a:cs typeface="+mn-cs"/>
-                <a:sym typeface="Helvetica Neue Medium"/>
-              </a:defRPr>
-            </a:pPr>
-          </a:p>
-        </p:txBody>
-      </p:sp>
-      <p:sp>
-        <p:nvSpPr>
-          <p:cNvPr id="146" name="2018game.picoctf.com"/>
-          <p:cNvSpPr txBox="1"/>
-          <p:nvPr/>
-        </p:nvSpPr>
-        <p:spPr>
-          <a:xfrm>
-            <a:off x="150706" y="5765896"/>
-            <a:ext cx="4936681" cy="634808"/>
-          </a:xfrm>
-          <a:prstGeom prst="rect">
-            <a:avLst/>
-          </a:prstGeom>
-          <a:ln w="12700">
-            <a:miter lim="400000"/>
-          </a:ln>
-          <a:extLst>
-            <a:ext uri="{C572A759-6A51-4108-AA02-DFA0A04FC94B}">
-              <ma14:wrappingTextBoxFlag xmlns:ma14="http://schemas.microsoft.com/office/mac/drawingml/2011/main" val="1"/>
-            </a:ext>
-          </a:extLst>
-        </p:spPr>
-        <p:txBody>
-          <a:bodyPr wrap="none" lIns="50800" tIns="50800" rIns="50800" bIns="50800" anchor="ctr">
-            <a:spAutoFit/>
-          </a:bodyPr>
-          <a:lstStyle>
-            <a:lvl1pPr>
-              <a:defRPr sz="3500"/>
-            </a:lvl1pPr>
-          </a:lstStyle>
-          <a:p>
-            <a:pPr/>
-            <a:r>
-              <a:t>2018game.picoctf.com</a:t>
+            <a:pPr/>
+            <a:r>
+              <a:t>Time to get started</a:t>
             </a:r>
           </a:p>
         </p:txBody>
@@ -3217,37 +3136,9 @@
           <a:chExt cx="0" cy="0"/>
         </a:xfrm>
       </p:grpSpPr>
-      <p:sp>
-        <p:nvSpPr>
-          <p:cNvPr id="148" name="Lets capture our first flag"/>
-          <p:cNvSpPr txBox="1"/>
-          <p:nvPr>
-            <p:ph type="title"/>
-          </p:nvPr>
-        </p:nvSpPr>
-        <p:spPr>
-          <a:prstGeom prst="rect">
-            <a:avLst/>
-          </a:prstGeom>
-        </p:spPr>
-        <p:txBody>
-          <a:bodyPr/>
-          <a:lstStyle>
-            <a:lvl1pPr defTabSz="543305">
-              <a:defRPr sz="7440"/>
-            </a:lvl1pPr>
-          </a:lstStyle>
-          <a:p>
-            <a:pPr/>
-            <a:r>
-              <a:t>Lets capture our first flag</a:t>
-            </a:r>
-          </a:p>
-        </p:txBody>
-      </p:sp>
       <p:pic>
         <p:nvPicPr>
-          <p:cNvPr id="149" name="Image" descr="Image"/>
+          <p:cNvPr id="147" name="Image" descr="Image"/>
           <p:cNvPicPr>
             <a:picLocks noChangeAspect="1"/>
           </p:cNvPicPr>
@@ -3263,8 +3154,8 @@
         </p:blipFill>
         <p:spPr>
           <a:xfrm>
-            <a:off x="1358900" y="3102974"/>
-            <a:ext cx="8849161" cy="1670821"/>
+            <a:off x="504727" y="1542167"/>
+            <a:ext cx="11995346" cy="5701248"/>
           </a:xfrm>
           <a:prstGeom prst="rect">
             <a:avLst/>
@@ -3274,6 +3165,86 @@
           </a:ln>
         </p:spPr>
       </p:pic>
+      <p:sp>
+        <p:nvSpPr>
+          <p:cNvPr id="148" name="Line"/>
+          <p:cNvSpPr/>
+          <p:nvPr/>
+        </p:nvSpPr>
+        <p:spPr>
+          <a:xfrm flipV="1">
+            <a:off x="1392038" y="1862931"/>
+            <a:ext cx="1434556" cy="3923656"/>
+          </a:xfrm>
+          <a:prstGeom prst="line">
+            <a:avLst/>
+          </a:prstGeom>
+          <a:ln w="25400">
+            <a:solidFill>
+              <a:srgbClr val="000000"/>
+            </a:solidFill>
+            <a:miter lim="400000"/>
+            <a:tailEnd type="triangle"/>
+          </a:ln>
+        </p:spPr>
+        <p:txBody>
+          <a:bodyPr lIns="50800" tIns="50800" rIns="50800" bIns="50800" anchor="ctr"/>
+          <a:lstStyle/>
+          <a:p>
+            <a:pPr>
+              <a:defRPr b="0" sz="2200">
+                <a:solidFill>
+                  <a:srgbClr val="FFFFFF"/>
+                </a:solidFill>
+                <a:latin typeface="+mn-lt"/>
+                <a:ea typeface="+mn-ea"/>
+                <a:cs typeface="+mn-cs"/>
+                <a:sym typeface="Helvetica Neue Medium"/>
+              </a:defRPr>
+            </a:pPr>
+          </a:p>
+        </p:txBody>
+      </p:sp>
+      <p:sp>
+        <p:nvSpPr>
+          <p:cNvPr id="149" name="2018game.picoctf.com"/>
+          <p:cNvSpPr txBox="1"/>
+          <p:nvPr/>
+        </p:nvSpPr>
+        <p:spPr>
+          <a:xfrm>
+            <a:off x="150706" y="5765896"/>
+            <a:ext cx="4936681" cy="634808"/>
+          </a:xfrm>
+          <a:prstGeom prst="rect">
+            <a:avLst/>
+          </a:prstGeom>
+          <a:ln w="12700">
+            <a:miter lim="400000"/>
+          </a:ln>
+          <a:extLst>
+            <a:ext uri="{C572A759-6A51-4108-AA02-DFA0A04FC94B}">
+              <ma14:wrappingTextBoxFlag xmlns:ma14="http://schemas.microsoft.com/office/mac/drawingml/2011/main" val="1"/>
+            </a:ext>
+          </a:extLst>
+        </p:spPr>
+        <p:txBody>
+          <a:bodyPr wrap="none" lIns="50800" tIns="50800" rIns="50800" bIns="50800" anchor="ctr">
+            <a:spAutoFit/>
+          </a:bodyPr>
+          <a:lstStyle>
+            <a:lvl1pPr>
+              <a:defRPr sz="3500"/>
+            </a:lvl1pPr>
+          </a:lstStyle>
+          <a:p>
+            <a:pPr/>
+            <a:r>
+              <a:t>2018game.picoctf.com</a:t>
+            </a:r>
+          </a:p>
+        </p:txBody>
+      </p:sp>
     </p:spTree>
   </p:cSld>
   <p:clrMapOvr>
@@ -3300,9 +3271,37 @@
           <a:chExt cx="0" cy="0"/>
         </a:xfrm>
       </p:grpSpPr>
+      <p:sp>
+        <p:nvSpPr>
+          <p:cNvPr id="151" name="Lets capture our first flag"/>
+          <p:cNvSpPr txBox="1"/>
+          <p:nvPr>
+            <p:ph type="title"/>
+          </p:nvPr>
+        </p:nvSpPr>
+        <p:spPr>
+          <a:prstGeom prst="rect">
+            <a:avLst/>
+          </a:prstGeom>
+        </p:spPr>
+        <p:txBody>
+          <a:bodyPr/>
+          <a:lstStyle>
+            <a:lvl1pPr defTabSz="543305">
+              <a:defRPr sz="7440"/>
+            </a:lvl1pPr>
+          </a:lstStyle>
+          <a:p>
+            <a:pPr/>
+            <a:r>
+              <a:t>Lets capture our first flag</a:t>
+            </a:r>
+          </a:p>
+        </p:txBody>
+      </p:sp>
       <p:pic>
         <p:nvPicPr>
-          <p:cNvPr id="151" name="Image" descr="Image"/>
+          <p:cNvPr id="152" name="Image" descr="Image"/>
           <p:cNvPicPr>
             <a:picLocks noChangeAspect="1"/>
           </p:cNvPicPr>
@@ -3318,8 +3317,8 @@
         </p:blipFill>
         <p:spPr>
           <a:xfrm>
-            <a:off x="730250" y="3105150"/>
-            <a:ext cx="11544300" cy="3543300"/>
+            <a:off x="1358900" y="3102974"/>
+            <a:ext cx="8849161" cy="1670821"/>
           </a:xfrm>
           <a:prstGeom prst="rect">
             <a:avLst/>
@@ -3355,30 +3354,6 @@
           <a:chExt cx="0" cy="0"/>
         </a:xfrm>
       </p:grpSpPr>
-      <p:sp>
-        <p:nvSpPr>
-          <p:cNvPr id="153" name="Warm up #1"/>
-          <p:cNvSpPr txBox="1"/>
-          <p:nvPr>
-            <p:ph type="title"/>
-          </p:nvPr>
-        </p:nvSpPr>
-        <p:spPr>
-          <a:prstGeom prst="rect">
-            <a:avLst/>
-          </a:prstGeom>
-        </p:spPr>
-        <p:txBody>
-          <a:bodyPr/>
-          <a:lstStyle/>
-          <a:p>
-            <a:pPr/>
-            <a:r>
-              <a:t>Warm up #1</a:t>
-            </a:r>
-          </a:p>
-        </p:txBody>
-      </p:sp>
       <p:pic>
         <p:nvPicPr>
           <p:cNvPr id="154" name="Image" descr="Image"/>
@@ -3397,37 +3372,8 @@
         </p:blipFill>
         <p:spPr>
           <a:xfrm>
-            <a:off x="2078154" y="2769250"/>
-            <a:ext cx="8848492" cy="1810096"/>
-          </a:xfrm>
-          <a:prstGeom prst="rect">
-            <a:avLst/>
-          </a:prstGeom>
-          <a:ln w="12700">
-            <a:miter lim="400000"/>
-          </a:ln>
-        </p:spPr>
-      </p:pic>
-      <p:pic>
-        <p:nvPicPr>
-          <p:cNvPr id="155" name="Image" descr="Image"/>
-          <p:cNvPicPr>
-            <a:picLocks noChangeAspect="1"/>
-          </p:cNvPicPr>
-          <p:nvPr/>
-        </p:nvPicPr>
-        <p:blipFill>
-          <a:blip r:embed="rId3">
-            <a:extLst/>
-          </a:blip>
-          <a:stretch>
-            <a:fillRect/>
-          </a:stretch>
-        </p:blipFill>
-        <p:spPr>
-          <a:xfrm>
-            <a:off x="2058312" y="4935596"/>
-            <a:ext cx="8888176" cy="1609608"/>
+            <a:off x="730250" y="3105150"/>
+            <a:ext cx="11544300" cy="3543300"/>
           </a:xfrm>
           <a:prstGeom prst="rect">
             <a:avLst/>
@@ -3465,7 +3411,7 @@
       </p:grpSpPr>
       <p:sp>
         <p:nvSpPr>
-          <p:cNvPr id="157" name="Lets figure this one out together"/>
+          <p:cNvPr id="156" name="Warm up #1"/>
           <p:cNvSpPr txBox="1"/>
           <p:nvPr>
             <p:ph type="title"/>
@@ -3478,22 +3424,18 @@
         </p:spPr>
         <p:txBody>
           <a:bodyPr/>
-          <a:lstStyle>
-            <a:lvl1pPr defTabSz="484886">
-              <a:defRPr sz="6640"/>
-            </a:lvl1pPr>
-          </a:lstStyle>
-          <a:p>
-            <a:pPr/>
-            <a:r>
-              <a:t>Lets figure this one out together</a:t>
+          <a:lstStyle/>
+          <a:p>
+            <a:pPr/>
+            <a:r>
+              <a:t>Warm up #1</a:t>
             </a:r>
           </a:p>
         </p:txBody>
       </p:sp>
       <p:pic>
         <p:nvPicPr>
-          <p:cNvPr id="158" name="Image" descr="Image"/>
+          <p:cNvPr id="157" name="Image" descr="Image"/>
           <p:cNvPicPr>
             <a:picLocks noChangeAspect="1"/>
           </p:cNvPicPr>
@@ -3509,8 +3451,37 @@
         </p:blipFill>
         <p:spPr>
           <a:xfrm>
-            <a:off x="230741" y="3168705"/>
-            <a:ext cx="12543318" cy="2339516"/>
+            <a:off x="2078154" y="2769250"/>
+            <a:ext cx="8848492" cy="1810096"/>
+          </a:xfrm>
+          <a:prstGeom prst="rect">
+            <a:avLst/>
+          </a:prstGeom>
+          <a:ln w="12700">
+            <a:miter lim="400000"/>
+          </a:ln>
+        </p:spPr>
+      </p:pic>
+      <p:pic>
+        <p:nvPicPr>
+          <p:cNvPr id="158" name="Image" descr="Image"/>
+          <p:cNvPicPr>
+            <a:picLocks noChangeAspect="1"/>
+          </p:cNvPicPr>
+          <p:nvPr/>
+        </p:nvPicPr>
+        <p:blipFill>
+          <a:blip r:embed="rId3">
+            <a:extLst/>
+          </a:blip>
+          <a:stretch>
+            <a:fillRect/>
+          </a:stretch>
+        </p:blipFill>
+        <p:spPr>
+          <a:xfrm>
+            <a:off x="2058312" y="4935596"/>
+            <a:ext cx="8888176" cy="1609608"/>
           </a:xfrm>
           <a:prstGeom prst="rect">
             <a:avLst/>
@@ -3546,9 +3517,37 @@
           <a:chExt cx="0" cy="0"/>
         </a:xfrm>
       </p:grpSpPr>
+      <p:sp>
+        <p:nvSpPr>
+          <p:cNvPr id="160" name="Lets figure this one out together"/>
+          <p:cNvSpPr txBox="1"/>
+          <p:nvPr>
+            <p:ph type="title"/>
+          </p:nvPr>
+        </p:nvSpPr>
+        <p:spPr>
+          <a:prstGeom prst="rect">
+            <a:avLst/>
+          </a:prstGeom>
+        </p:spPr>
+        <p:txBody>
+          <a:bodyPr/>
+          <a:lstStyle>
+            <a:lvl1pPr defTabSz="484886">
+              <a:defRPr sz="6640"/>
+            </a:lvl1pPr>
+          </a:lstStyle>
+          <a:p>
+            <a:pPr/>
+            <a:r>
+              <a:t>Lets figure this one out together</a:t>
+            </a:r>
+          </a:p>
+        </p:txBody>
+      </p:sp>
       <p:pic>
         <p:nvPicPr>
-          <p:cNvPr id="160" name="Image" descr="Image"/>
+          <p:cNvPr id="161" name="Image" descr="Image"/>
           <p:cNvPicPr>
             <a:picLocks noChangeAspect="1"/>
           </p:cNvPicPr>
@@ -3564,8 +3563,8 @@
         </p:blipFill>
         <p:spPr>
           <a:xfrm>
-            <a:off x="2882900" y="2559050"/>
-            <a:ext cx="7239000" cy="4635500"/>
+            <a:off x="230741" y="3168705"/>
+            <a:ext cx="12543318" cy="2339516"/>
           </a:xfrm>
           <a:prstGeom prst="rect">
             <a:avLst/>
@@ -3603,7 +3602,7 @@
       </p:grpSpPr>
       <p:pic>
         <p:nvPicPr>
-          <p:cNvPr id="162" name="Image" descr="Image"/>
+          <p:cNvPr id="163" name="Image" descr="Image"/>
           <p:cNvPicPr>
             <a:picLocks noChangeAspect="1"/>
           </p:cNvPicPr>
@@ -3619,8 +3618,8 @@
         </p:blipFill>
         <p:spPr>
           <a:xfrm>
-            <a:off x="730250" y="3105150"/>
-            <a:ext cx="11544300" cy="3543300"/>
+            <a:off x="2882900" y="2559050"/>
+            <a:ext cx="7239000" cy="4635500"/>
           </a:xfrm>
           <a:prstGeom prst="rect">
             <a:avLst/>
@@ -3656,34 +3655,6 @@
           <a:chExt cx="0" cy="0"/>
         </a:xfrm>
       </p:grpSpPr>
-      <p:sp>
-        <p:nvSpPr>
-          <p:cNvPr id="164" name="Let’s do one more together"/>
-          <p:cNvSpPr txBox="1"/>
-          <p:nvPr>
-            <p:ph type="title"/>
-          </p:nvPr>
-        </p:nvSpPr>
-        <p:spPr>
-          <a:prstGeom prst="rect">
-            <a:avLst/>
-          </a:prstGeom>
-        </p:spPr>
-        <p:txBody>
-          <a:bodyPr/>
-          <a:lstStyle>
-            <a:lvl1pPr defTabSz="502412">
-              <a:defRPr sz="6880"/>
-            </a:lvl1pPr>
-          </a:lstStyle>
-          <a:p>
-            <a:pPr/>
-            <a:r>
-              <a:t>Let’s do one more together</a:t>
-            </a:r>
-          </a:p>
-        </p:txBody>
-      </p:sp>
       <p:pic>
         <p:nvPicPr>
           <p:cNvPr id="165" name="Image" descr="Image"/>
@@ -3702,37 +3673,8 @@
         </p:blipFill>
         <p:spPr>
           <a:xfrm>
-            <a:off x="527509" y="3654543"/>
-            <a:ext cx="11949782" cy="2444514"/>
-          </a:xfrm>
-          <a:prstGeom prst="rect">
-            <a:avLst/>
-          </a:prstGeom>
-          <a:ln w="12700">
-            <a:miter lim="400000"/>
-          </a:ln>
-        </p:spPr>
-      </p:pic>
-      <p:pic>
-        <p:nvPicPr>
-          <p:cNvPr id="166" name="Image" descr="Image"/>
-          <p:cNvPicPr>
-            <a:picLocks noChangeAspect="1"/>
-          </p:cNvPicPr>
-          <p:nvPr/>
-        </p:nvPicPr>
-        <p:blipFill>
-          <a:blip r:embed="rId3">
-            <a:extLst/>
-          </a:blip>
-          <a:stretch>
-            <a:fillRect/>
-          </a:stretch>
-        </p:blipFill>
-        <p:spPr>
-          <a:xfrm>
-            <a:off x="541453" y="6727454"/>
-            <a:ext cx="11921894" cy="2159001"/>
+            <a:off x="730250" y="3105150"/>
+            <a:ext cx="11544300" cy="3543300"/>
           </a:xfrm>
           <a:prstGeom prst="rect">
             <a:avLst/>
@@ -3768,6 +3710,34 @@
           <a:chExt cx="0" cy="0"/>
         </a:xfrm>
       </p:grpSpPr>
+      <p:sp>
+        <p:nvSpPr>
+          <p:cNvPr id="167" name="Let’s do one more together"/>
+          <p:cNvSpPr txBox="1"/>
+          <p:nvPr>
+            <p:ph type="title"/>
+          </p:nvPr>
+        </p:nvSpPr>
+        <p:spPr>
+          <a:prstGeom prst="rect">
+            <a:avLst/>
+          </a:prstGeom>
+        </p:spPr>
+        <p:txBody>
+          <a:bodyPr/>
+          <a:lstStyle>
+            <a:lvl1pPr defTabSz="502412">
+              <a:defRPr sz="6880"/>
+            </a:lvl1pPr>
+          </a:lstStyle>
+          <a:p>
+            <a:pPr/>
+            <a:r>
+              <a:t>Let’s do one more together</a:t>
+            </a:r>
+          </a:p>
+        </p:txBody>
+      </p:sp>
       <p:pic>
         <p:nvPicPr>
           <p:cNvPr id="168" name="Image" descr="Image"/>
@@ -3786,8 +3756,37 @@
         </p:blipFill>
         <p:spPr>
           <a:xfrm>
-            <a:off x="2889250" y="2940050"/>
-            <a:ext cx="7226300" cy="3873500"/>
+            <a:off x="527509" y="3654543"/>
+            <a:ext cx="11949782" cy="2444514"/>
+          </a:xfrm>
+          <a:prstGeom prst="rect">
+            <a:avLst/>
+          </a:prstGeom>
+          <a:ln w="12700">
+            <a:miter lim="400000"/>
+          </a:ln>
+        </p:spPr>
+      </p:pic>
+      <p:pic>
+        <p:nvPicPr>
+          <p:cNvPr id="169" name="Image" descr="Image"/>
+          <p:cNvPicPr>
+            <a:picLocks noChangeAspect="1"/>
+          </p:cNvPicPr>
+          <p:nvPr/>
+        </p:nvPicPr>
+        <p:blipFill>
+          <a:blip r:embed="rId3">
+            <a:extLst/>
+          </a:blip>
+          <a:stretch>
+            <a:fillRect/>
+          </a:stretch>
+        </p:blipFill>
+        <p:spPr>
+          <a:xfrm>
+            <a:off x="541453" y="6727454"/>
+            <a:ext cx="11921894" cy="2159001"/>
           </a:xfrm>
           <a:prstGeom prst="rect">
             <a:avLst/>
@@ -3825,7 +3824,7 @@
       </p:grpSpPr>
       <p:pic>
         <p:nvPicPr>
-          <p:cNvPr id="170" name="Image" descr="Image"/>
+          <p:cNvPr id="171" name="Image" descr="Image"/>
           <p:cNvPicPr>
             <a:picLocks noChangeAspect="1"/>
           </p:cNvPicPr>
@@ -3841,8 +3840,8 @@
         </p:blipFill>
         <p:spPr>
           <a:xfrm>
-            <a:off x="2041895" y="148302"/>
-            <a:ext cx="8921010" cy="9456996"/>
+            <a:off x="2889250" y="2940050"/>
+            <a:ext cx="7226300" cy="3873500"/>
           </a:xfrm>
           <a:prstGeom prst="rect">
             <a:avLst/>
@@ -3952,30 +3951,6 @@
           <a:chExt cx="0" cy="0"/>
         </a:xfrm>
       </p:grpSpPr>
-      <p:sp>
-        <p:nvSpPr>
-          <p:cNvPr id="172" name="One more for fun"/>
-          <p:cNvSpPr txBox="1"/>
-          <p:nvPr>
-            <p:ph type="title"/>
-          </p:nvPr>
-        </p:nvSpPr>
-        <p:spPr>
-          <a:prstGeom prst="rect">
-            <a:avLst/>
-          </a:prstGeom>
-        </p:spPr>
-        <p:txBody>
-          <a:bodyPr/>
-          <a:lstStyle/>
-          <a:p>
-            <a:pPr/>
-            <a:r>
-              <a:t>One more for fun</a:t>
-            </a:r>
-          </a:p>
-        </p:txBody>
-      </p:sp>
       <p:pic>
         <p:nvPicPr>
           <p:cNvPr id="173" name="Image" descr="Image"/>
@@ -3994,8 +3969,8 @@
         </p:blipFill>
         <p:spPr>
           <a:xfrm>
-            <a:off x="1091148" y="3742507"/>
-            <a:ext cx="10822504" cy="2014373"/>
+            <a:off x="2041895" y="148302"/>
+            <a:ext cx="8921010" cy="9456996"/>
           </a:xfrm>
           <a:prstGeom prst="rect">
             <a:avLst/>
@@ -4033,7 +4008,7 @@
       </p:grpSpPr>
       <p:sp>
         <p:nvSpPr>
-          <p:cNvPr id="175" name="OSINT"/>
+          <p:cNvPr id="175" name="One more for fun"/>
           <p:cNvSpPr txBox="1"/>
           <p:nvPr>
             <p:ph type="title"/>
@@ -4050,35 +4025,14 @@
           <a:p>
             <a:pPr/>
             <a:r>
-              <a:t>OSINT</a:t>
-            </a:r>
-          </a:p>
-        </p:txBody>
-      </p:sp>
-      <p:sp>
-        <p:nvSpPr>
-          <p:cNvPr id="176" name="Body"/>
-          <p:cNvSpPr txBox="1"/>
-          <p:nvPr>
-            <p:ph type="body" idx="1"/>
-          </p:nvPr>
-        </p:nvSpPr>
-        <p:spPr>
-          <a:prstGeom prst="rect">
-            <a:avLst/>
-          </a:prstGeom>
-        </p:spPr>
-        <p:txBody>
-          <a:bodyPr/>
-          <a:lstStyle/>
-          <a:p>
-            <a:pPr/>
+              <a:t>One more for fun</a:t>
+            </a:r>
           </a:p>
         </p:txBody>
       </p:sp>
       <p:pic>
         <p:nvPicPr>
-          <p:cNvPr id="177" name="Image" descr="Image"/>
+          <p:cNvPr id="176" name="Image" descr="Image"/>
           <p:cNvPicPr>
             <a:picLocks noChangeAspect="1"/>
           </p:cNvPicPr>
@@ -4094,8 +4048,8 @@
         </p:blipFill>
         <p:spPr>
           <a:xfrm>
-            <a:off x="1308100" y="2679700"/>
-            <a:ext cx="10388600" cy="4394200"/>
+            <a:off x="1091148" y="3742507"/>
+            <a:ext cx="10822504" cy="2014373"/>
           </a:xfrm>
           <a:prstGeom prst="rect">
             <a:avLst/>
@@ -4133,7 +4087,7 @@
       </p:grpSpPr>
       <p:sp>
         <p:nvSpPr>
-          <p:cNvPr id="179" name="Title"/>
+          <p:cNvPr id="178" name="OSINT"/>
           <p:cNvSpPr txBox="1"/>
           <p:nvPr>
             <p:ph type="title"/>
@@ -4149,12 +4103,15 @@
           <a:lstStyle/>
           <a:p>
             <a:pPr/>
+            <a:r>
+              <a:t>OSINT</a:t>
+            </a:r>
           </a:p>
         </p:txBody>
       </p:sp>
       <p:sp>
         <p:nvSpPr>
-          <p:cNvPr id="180" name="Body"/>
+          <p:cNvPr id="179" name="Body"/>
           <p:cNvSpPr txBox="1"/>
           <p:nvPr>
             <p:ph type="body" idx="1"/>
@@ -4175,7 +4132,7 @@
       </p:sp>
       <p:pic>
         <p:nvPicPr>
-          <p:cNvPr id="181" name="Image" descr="Image"/>
+          <p:cNvPr id="180" name="Image" descr="Image"/>
           <p:cNvPicPr>
             <a:picLocks noChangeAspect="1"/>
           </p:cNvPicPr>
@@ -4191,8 +4148,8 @@
         </p:blipFill>
         <p:spPr>
           <a:xfrm>
-            <a:off x="685412" y="984250"/>
-            <a:ext cx="11887977" cy="9753600"/>
+            <a:off x="1308100" y="2679700"/>
+            <a:ext cx="10388600" cy="4394200"/>
           </a:xfrm>
           <a:prstGeom prst="rect">
             <a:avLst/>
@@ -4230,7 +4187,7 @@
       </p:grpSpPr>
       <p:sp>
         <p:nvSpPr>
-          <p:cNvPr id="183" name="Additional resources"/>
+          <p:cNvPr id="182" name="Title"/>
           <p:cNvSpPr txBox="1"/>
           <p:nvPr>
             <p:ph type="title"/>
@@ -4246,15 +4203,12 @@
           <a:lstStyle/>
           <a:p>
             <a:pPr/>
-            <a:r>
-              <a:t>Additional resources</a:t>
-            </a:r>
           </a:p>
         </p:txBody>
       </p:sp>
       <p:sp>
         <p:nvSpPr>
-          <p:cNvPr id="184" name="Youtube…"/>
+          <p:cNvPr id="183" name="Body"/>
           <p:cNvSpPr txBox="1"/>
           <p:nvPr>
             <p:ph type="body" idx="1"/>
@@ -4270,24 +4224,38 @@
           <a:lstStyle/>
           <a:p>
             <a:pPr/>
-            <a:r>
-              <a:t>Youtube</a:t>
-            </a:r>
-          </a:p>
-          <a:p>
-            <a:pPr/>
-            <a:r>
-              <a:t>Ian Coldwater </a:t>
-            </a:r>
-            <a:r>
-              <a:rPr u="sng">
-                <a:hlinkClick r:id="rId2" invalidUrl="" action="" tgtFrame="" tooltip="" history="1" highlightClick="0" endSnd="0"/>
-              </a:rPr>
-              <a:t>@IanColdwater</a:t>
-            </a:r>
           </a:p>
         </p:txBody>
       </p:sp>
+      <p:pic>
+        <p:nvPicPr>
+          <p:cNvPr id="184" name="Image" descr="Image"/>
+          <p:cNvPicPr>
+            <a:picLocks noChangeAspect="1"/>
+          </p:cNvPicPr>
+          <p:nvPr/>
+        </p:nvPicPr>
+        <p:blipFill>
+          <a:blip r:embed="rId2">
+            <a:extLst/>
+          </a:blip>
+          <a:stretch>
+            <a:fillRect/>
+          </a:stretch>
+        </p:blipFill>
+        <p:spPr>
+          <a:xfrm>
+            <a:off x="685412" y="984250"/>
+            <a:ext cx="11887977" cy="9753600"/>
+          </a:xfrm>
+          <a:prstGeom prst="rect">
+            <a:avLst/>
+          </a:prstGeom>
+          <a:ln w="12700">
+            <a:miter lim="400000"/>
+          </a:ln>
+        </p:spPr>
+      </p:pic>
     </p:spTree>
   </p:cSld>
   <p:clrMapOvr>
@@ -4316,7 +4284,7 @@
       </p:grpSpPr>
       <p:sp>
         <p:nvSpPr>
-          <p:cNvPr id="186" name="That’s all there is to it…"/>
+          <p:cNvPr id="186" name="Can anyone give me another way"/>
           <p:cNvSpPr txBox="1"/>
           <p:nvPr>
             <p:ph type="title"/>
@@ -4329,30 +4297,303 @@
         </p:spPr>
         <p:txBody>
           <a:bodyPr/>
+          <a:lstStyle>
+            <a:lvl1pPr defTabSz="484886">
+              <a:defRPr sz="6640"/>
+            </a:lvl1pPr>
+          </a:lstStyle>
+          <a:p>
+            <a:pPr/>
+            <a:r>
+              <a:t>Can anyone give me another way</a:t>
+            </a:r>
+          </a:p>
+        </p:txBody>
+      </p:sp>
+    </p:spTree>
+  </p:cSld>
+  <p:clrMapOvr>
+    <a:masterClrMapping/>
+  </p:clrMapOvr>
+  <p:transition xmlns:p14="http://schemas.microsoft.com/office/powerpoint/2010/main" spd="med" advClick="1"/>
+</p:sld>
+</file>
+
+<file path=ppt/slides/slide25.xml><?xml version="1.0" encoding="utf-8"?>
+<p:sld xmlns:a="http://schemas.openxmlformats.org/drawingml/2006/main" xmlns:r="http://schemas.openxmlformats.org/officeDocument/2006/relationships" xmlns:p="http://schemas.openxmlformats.org/presentationml/2006/main" xmlns:m="http://schemas.openxmlformats.org/officeDocument/2006/math" xmlns:a14="http://schemas.microsoft.com/office/drawing/2010/main" showMasterSp="1" showMasterPhAnim="1">
+  <p:cSld>
+    <p:spTree>
+      <p:nvGrpSpPr>
+        <p:cNvPr id="1" name=""/>
+        <p:cNvGrpSpPr/>
+        <p:nvPr/>
+      </p:nvGrpSpPr>
+      <p:grpSpPr>
+        <a:xfrm>
+          <a:off x="0" y="0"/>
+          <a:ext cx="0" cy="0"/>
+          <a:chOff x="0" y="0"/>
+          <a:chExt cx="0" cy="0"/>
+        </a:xfrm>
+      </p:grpSpPr>
+      <p:sp>
+        <p:nvSpPr>
+          <p:cNvPr id="188" name="How About Python"/>
+          <p:cNvSpPr txBox="1"/>
+          <p:nvPr>
+            <p:ph type="title"/>
+          </p:nvPr>
+        </p:nvSpPr>
+        <p:spPr>
+          <a:prstGeom prst="rect">
+            <a:avLst/>
+          </a:prstGeom>
+        </p:spPr>
+        <p:txBody>
+          <a:bodyPr/>
           <a:lstStyle/>
           <a:p>
             <a:pPr/>
             <a:r>
-              <a:t>That’s all there is to it</a:t>
-            </a:r>
-          </a:p>
-          <a:p>
-            <a:pPr/>
-            <a:r>
-              <a:t>Go have fun now</a:t>
+              <a:t>How About Python</a:t>
+            </a:r>
+          </a:p>
+        </p:txBody>
+      </p:sp>
+      <p:pic>
+        <p:nvPicPr>
+          <p:cNvPr id="189" name="Image" descr="Image"/>
+          <p:cNvPicPr>
+            <a:picLocks noChangeAspect="1"/>
+          </p:cNvPicPr>
+          <p:nvPr/>
+        </p:nvPicPr>
+        <p:blipFill>
+          <a:blip r:embed="rId2">
+            <a:extLst/>
+          </a:blip>
+          <a:stretch>
+            <a:fillRect/>
+          </a:stretch>
+        </p:blipFill>
+        <p:spPr>
+          <a:xfrm>
+            <a:off x="2452144" y="3146815"/>
+            <a:ext cx="8100512" cy="5187170"/>
+          </a:xfrm>
+          <a:prstGeom prst="rect">
+            <a:avLst/>
+          </a:prstGeom>
+          <a:ln w="12700">
+            <a:miter lim="400000"/>
+          </a:ln>
+        </p:spPr>
+      </p:pic>
+    </p:spTree>
+  </p:cSld>
+  <p:clrMapOvr>
+    <a:masterClrMapping/>
+  </p:clrMapOvr>
+  <p:transition xmlns:p14="http://schemas.microsoft.com/office/powerpoint/2010/main" spd="med" advClick="1"/>
+</p:sld>
+</file>
+
+<file path=ppt/slides/slide26.xml><?xml version="1.0" encoding="utf-8"?>
+<p:sld xmlns:a="http://schemas.openxmlformats.org/drawingml/2006/main" xmlns:r="http://schemas.openxmlformats.org/officeDocument/2006/relationships" xmlns:p="http://schemas.openxmlformats.org/presentationml/2006/main" xmlns:m="http://schemas.openxmlformats.org/officeDocument/2006/math" xmlns:a14="http://schemas.microsoft.com/office/drawing/2010/main" showMasterSp="1" showMasterPhAnim="1">
+  <p:cSld>
+    <p:spTree>
+      <p:nvGrpSpPr>
+        <p:cNvPr id="1" name=""/>
+        <p:cNvGrpSpPr/>
+        <p:nvPr/>
+      </p:nvGrpSpPr>
+      <p:grpSpPr>
+        <a:xfrm>
+          <a:off x="0" y="0"/>
+          <a:ext cx="0" cy="0"/>
+          <a:chOff x="0" y="0"/>
+          <a:chExt cx="0" cy="0"/>
+        </a:xfrm>
+      </p:grpSpPr>
+      <p:sp>
+        <p:nvSpPr>
+          <p:cNvPr id="191" name="Any others"/>
+          <p:cNvSpPr txBox="1"/>
+          <p:nvPr>
+            <p:ph type="title"/>
+          </p:nvPr>
+        </p:nvSpPr>
+        <p:spPr>
+          <a:xfrm>
+            <a:off x="952500" y="3797300"/>
+            <a:ext cx="11099800" cy="2159000"/>
+          </a:xfrm>
+          <a:prstGeom prst="rect">
+            <a:avLst/>
+          </a:prstGeom>
+        </p:spPr>
+        <p:txBody>
+          <a:bodyPr/>
+          <a:lstStyle/>
+          <a:p>
+            <a:pPr/>
+            <a:r>
+              <a:t>Any others</a:t>
+            </a:r>
+          </a:p>
+        </p:txBody>
+      </p:sp>
+    </p:spTree>
+  </p:cSld>
+  <p:clrMapOvr>
+    <a:masterClrMapping/>
+  </p:clrMapOvr>
+  <p:transition xmlns:p14="http://schemas.microsoft.com/office/powerpoint/2010/main" spd="med" advClick="1"/>
+</p:sld>
+</file>
+
+<file path=ppt/slides/slide27.xml><?xml version="1.0" encoding="utf-8"?>
+<p:sld xmlns:a="http://schemas.openxmlformats.org/drawingml/2006/main" xmlns:r="http://schemas.openxmlformats.org/officeDocument/2006/relationships" xmlns:p="http://schemas.openxmlformats.org/presentationml/2006/main" xmlns:m="http://schemas.openxmlformats.org/officeDocument/2006/math" xmlns:a14="http://schemas.microsoft.com/office/drawing/2010/main" showMasterSp="1" showMasterPhAnim="1">
+  <p:cSld>
+    <p:spTree>
+      <p:nvGrpSpPr>
+        <p:cNvPr id="1" name=""/>
+        <p:cNvGrpSpPr/>
+        <p:nvPr/>
+      </p:nvGrpSpPr>
+      <p:grpSpPr>
+        <a:xfrm>
+          <a:off x="0" y="0"/>
+          <a:ext cx="0" cy="0"/>
+          <a:chOff x="0" y="0"/>
+          <a:chExt cx="0" cy="0"/>
+        </a:xfrm>
+      </p:grpSpPr>
+      <p:sp>
+        <p:nvSpPr>
+          <p:cNvPr id="193" name="Additional resources"/>
+          <p:cNvSpPr txBox="1"/>
+          <p:nvPr>
+            <p:ph type="title"/>
+          </p:nvPr>
+        </p:nvSpPr>
+        <p:spPr>
+          <a:prstGeom prst="rect">
+            <a:avLst/>
+          </a:prstGeom>
+        </p:spPr>
+        <p:txBody>
+          <a:bodyPr/>
+          <a:lstStyle/>
+          <a:p>
+            <a:pPr/>
+            <a:r>
+              <a:t>Additional resources</a:t>
             </a:r>
           </a:p>
         </p:txBody>
       </p:sp>
       <p:sp>
         <p:nvSpPr>
-          <p:cNvPr id="187" name="Miki Demeter…"/>
+          <p:cNvPr id="194" name="Youtube…"/>
+          <p:cNvSpPr txBox="1"/>
+          <p:nvPr>
+            <p:ph type="body" idx="1"/>
+          </p:nvPr>
+        </p:nvSpPr>
+        <p:spPr>
+          <a:prstGeom prst="rect">
+            <a:avLst/>
+          </a:prstGeom>
+        </p:spPr>
+        <p:txBody>
+          <a:bodyPr/>
+          <a:lstStyle/>
+          <a:p>
+            <a:pPr/>
+            <a:r>
+              <a:t>Youtube</a:t>
+            </a:r>
+          </a:p>
+          <a:p>
+            <a:pPr/>
+            <a:r>
+              <a:t>Ian Coldwater </a:t>
+            </a:r>
+            <a:r>
+              <a:rPr u="sng">
+                <a:hlinkClick r:id="rId2" invalidUrl="" action="" tgtFrame="" tooltip="" history="1" highlightClick="0" endSnd="0"/>
+              </a:rPr>
+              <a:t>@IanColdwater</a:t>
+            </a:r>
+          </a:p>
+        </p:txBody>
+      </p:sp>
+    </p:spTree>
+  </p:cSld>
+  <p:clrMapOvr>
+    <a:masterClrMapping/>
+  </p:clrMapOvr>
+  <p:transition xmlns:p14="http://schemas.microsoft.com/office/powerpoint/2010/main" spd="med" advClick="1"/>
+</p:sld>
+</file>
+
+<file path=ppt/slides/slide28.xml><?xml version="1.0" encoding="utf-8"?>
+<p:sld xmlns:a="http://schemas.openxmlformats.org/drawingml/2006/main" xmlns:r="http://schemas.openxmlformats.org/officeDocument/2006/relationships" xmlns:p="http://schemas.openxmlformats.org/presentationml/2006/main" xmlns:m="http://schemas.openxmlformats.org/officeDocument/2006/math" xmlns:a14="http://schemas.microsoft.com/office/drawing/2010/main" showMasterSp="1" showMasterPhAnim="1">
+  <p:cSld>
+    <p:spTree>
+      <p:nvGrpSpPr>
+        <p:cNvPr id="1" name=""/>
+        <p:cNvGrpSpPr/>
+        <p:nvPr/>
+      </p:nvGrpSpPr>
+      <p:grpSpPr>
+        <a:xfrm>
+          <a:off x="0" y="0"/>
+          <a:ext cx="0" cy="0"/>
+          <a:chOff x="0" y="0"/>
+          <a:chExt cx="0" cy="0"/>
+        </a:xfrm>
+      </p:grpSpPr>
+      <p:sp>
+        <p:nvSpPr>
+          <p:cNvPr id="196" name="That’s all there is to it…"/>
+          <p:cNvSpPr txBox="1"/>
+          <p:nvPr>
+            <p:ph type="title"/>
+          </p:nvPr>
+        </p:nvSpPr>
+        <p:spPr>
+          <a:prstGeom prst="rect">
+            <a:avLst/>
+          </a:prstGeom>
+        </p:spPr>
+        <p:txBody>
+          <a:bodyPr/>
+          <a:lstStyle/>
+          <a:p>
+            <a:pPr/>
+            <a:r>
+              <a:t>That’s all there is to it</a:t>
+            </a:r>
+          </a:p>
+          <a:p>
+            <a:pPr/>
+            <a:r>
+              <a:t>Go have fun now</a:t>
+            </a:r>
+          </a:p>
+        </p:txBody>
+      </p:sp>
+      <p:sp>
+        <p:nvSpPr>
+          <p:cNvPr id="197" name="Miki Demeter…"/>
           <p:cNvSpPr txBox="1"/>
           <p:nvPr/>
         </p:nvSpPr>
         <p:spPr>
           <a:xfrm>
-            <a:off x="3156153" y="6786220"/>
+            <a:off x="184353" y="677520"/>
             <a:ext cx="6692494" cy="2302560"/>
           </a:xfrm>
           <a:prstGeom prst="rect">
@@ -4390,7 +4631,7 @@
           <a:p>
             <a:pPr algn="l"/>
             <a:r>
-              <a:t>email:</a:t>
+              <a:t>email: </a:t>
             </a:r>
             <a:r>
               <a:rPr u="sng">
@@ -4421,6 +4662,87 @@
                 <a:hlinkClick r:id="rId4" invalidUrl="" action="" tgtFrame="" tooltip="" history="1" highlightClick="0" endSnd="0"/>
               </a:rPr>
               <a:t>https://github.com/sec-princess</a:t>
+            </a:r>
+          </a:p>
+        </p:txBody>
+      </p:sp>
+      <p:sp>
+        <p:nvSpPr>
+          <p:cNvPr id="198" name="Stacy Watts…"/>
+          <p:cNvSpPr txBox="1"/>
+          <p:nvPr/>
+        </p:nvSpPr>
+        <p:spPr>
+          <a:xfrm>
+            <a:off x="5296103" y="6773520"/>
+            <a:ext cx="7416394" cy="2302560"/>
+          </a:xfrm>
+          <a:prstGeom prst="rect">
+            <a:avLst/>
+          </a:prstGeom>
+          <a:ln w="12700">
+            <a:miter lim="400000"/>
+          </a:ln>
+          <a:extLst>
+            <a:ext uri="{C572A759-6A51-4108-AA02-DFA0A04FC94B}">
+              <ma14:wrappingTextBoxFlag xmlns:ma14="http://schemas.microsoft.com/office/mac/drawingml/2011/main" val="1"/>
+            </a:ext>
+          </a:extLst>
+        </p:spPr>
+        <p:txBody>
+          <a:bodyPr wrap="none" lIns="50800" tIns="50800" rIns="50800" bIns="50800" anchor="ctr">
+            <a:spAutoFit/>
+          </a:bodyPr>
+          <a:lstStyle/>
+          <a:p>
+            <a:pPr/>
+            <a:r>
+              <a:t>Stacy Watts</a:t>
+            </a:r>
+          </a:p>
+          <a:p>
+            <a:pPr/>
+          </a:p>
+          <a:p>
+            <a:pPr algn="l"/>
+            <a:r>
+              <a:t>twitter: @stacybird</a:t>
+            </a:r>
+          </a:p>
+          <a:p>
+            <a:pPr algn="l"/>
+            <a:r>
+              <a:t>email: </a:t>
+            </a:r>
+            <a:r>
+              <a:rPr u="sng">
+                <a:hlinkClick r:id="rId5" invalidUrl="" action="" tgtFrame="" tooltip="" history="1" highlightClick="0" endSnd="0"/>
+              </a:rPr>
+              <a:t>dreamsong@gmail.com</a:t>
+            </a:r>
+          </a:p>
+          <a:p>
+            <a:pPr algn="l"/>
+            <a:r>
+              <a:t>linkedIn: </a:t>
+            </a:r>
+            <a:r>
+              <a:rPr u="sng">
+                <a:hlinkClick r:id="rId6" invalidUrl="" action="" tgtFrame="" tooltip="" history="1" highlightClick="0" endSnd="0"/>
+              </a:rPr>
+              <a:t>https://www.linkedin.com/in/stacywatts/</a:t>
+            </a:r>
+          </a:p>
+          <a:p>
+            <a:pPr algn="l"/>
+            <a:r>
+              <a:t>github: </a:t>
+            </a:r>
+            <a:r>
+              <a:rPr u="sng">
+                <a:hlinkClick r:id="rId7" invalidUrl="" action="" tgtFrame="" tooltip="" history="1" highlightClick="0" endSnd="0"/>
+              </a:rPr>
+              <a:t>https://github.com/stacybird</a:t>
             </a:r>
           </a:p>
         </p:txBody>
@@ -4453,7 +4775,7 @@
       </p:grpSpPr>
       <p:sp>
         <p:nvSpPr>
-          <p:cNvPr id="124" name="Who am I"/>
+          <p:cNvPr id="124" name="Who is Miki"/>
           <p:cNvSpPr txBox="1"/>
           <p:nvPr>
             <p:ph type="title"/>
@@ -4470,7 +4792,7 @@
           <a:p>
             <a:pPr/>
             <a:r>
-              <a:t>Who am I</a:t>
+              <a:t>Who is Miki</a:t>
             </a:r>
           </a:p>
         </p:txBody>
@@ -4506,13 +4828,13 @@
           <a:p>
             <a:pPr/>
             <a:r>
-              <a:t>Security Researcher </a:t>
-            </a:r>
-          </a:p>
-          <a:p>
-            <a:pPr/>
-            <a:r>
-              <a:t>Hacker</a:t>
+              <a:t>Security Researcher @ Intel</a:t>
+            </a:r>
+          </a:p>
+          <a:p>
+            <a:pPr/>
+            <a:r>
+              <a:t>Hacking nerd</a:t>
             </a:r>
           </a:p>
         </p:txBody>
@@ -4545,7 +4867,7 @@
       </p:grpSpPr>
       <p:sp>
         <p:nvSpPr>
-          <p:cNvPr id="127" name="Survey"/>
+          <p:cNvPr id="127" name="Who is Stacy"/>
           <p:cNvSpPr txBox="1"/>
           <p:nvPr>
             <p:ph type="title"/>
@@ -4562,14 +4884,14 @@
           <a:p>
             <a:pPr/>
             <a:r>
-              <a:t>Survey</a:t>
+              <a:t>Who is Stacy</a:t>
             </a:r>
           </a:p>
         </p:txBody>
       </p:sp>
       <p:sp>
         <p:nvSpPr>
-          <p:cNvPr id="128" name="Who has heard of CTF?…"/>
+          <p:cNvPr id="128" name="Masters Computer Science Portland State University…"/>
           <p:cNvSpPr txBox="1"/>
           <p:nvPr>
             <p:ph type="body" idx="1"/>
@@ -4586,13 +4908,25 @@
           <a:p>
             <a:pPr/>
             <a:r>
-              <a:t>Who has heard of CTF?</a:t>
-            </a:r>
-          </a:p>
-          <a:p>
-            <a:pPr/>
-            <a:r>
-              <a:t>Who has played CTF?</a:t>
+              <a:t>Masters Computer Science Portland State University</a:t>
+            </a:r>
+          </a:p>
+          <a:p>
+            <a:pPr/>
+            <a:r>
+              <a:t>Platform Engineer @ BlueVoyant </a:t>
+            </a:r>
+          </a:p>
+          <a:p>
+            <a:pPr/>
+            <a:r>
+              <a:t>Security nerd </a:t>
+            </a:r>
+          </a:p>
+          <a:p>
+            <a:pPr/>
+            <a:r>
+              <a:t>DevOps culture nerd</a:t>
             </a:r>
           </a:p>
         </p:txBody>
@@ -4625,7 +4959,7 @@
       </p:grpSpPr>
       <p:sp>
         <p:nvSpPr>
-          <p:cNvPr id="130" name="Types of CTF"/>
+          <p:cNvPr id="130" name="Survey"/>
           <p:cNvSpPr txBox="1"/>
           <p:nvPr>
             <p:ph type="title"/>
@@ -4642,14 +4976,14 @@
           <a:p>
             <a:pPr/>
             <a:r>
-              <a:t>Types of CTF</a:t>
+              <a:t>Survey</a:t>
             </a:r>
           </a:p>
         </p:txBody>
       </p:sp>
       <p:sp>
         <p:nvSpPr>
-          <p:cNvPr id="131" name="Blue Team (CCDC, CDX)…"/>
+          <p:cNvPr id="131" name="Who has heard of CTF?…"/>
           <p:cNvSpPr txBox="1"/>
           <p:nvPr>
             <p:ph type="body" idx="1"/>
@@ -4664,91 +4998,15 @@
           <a:bodyPr/>
           <a:lstStyle/>
           <a:p>
-            <a:pPr marL="583406" indent="-583406" defTabSz="457200">
-              <a:lnSpc>
-                <a:spcPts val="9800"/>
-              </a:lnSpc>
-              <a:spcBef>
-                <a:spcPts val="0"/>
-              </a:spcBef>
-              <a:defRPr sz="4200">
-                <a:solidFill>
-                  <a:srgbClr val="222222"/>
-                </a:solidFill>
-                <a:latin typeface="Helvetica"/>
-                <a:ea typeface="Helvetica"/>
-                <a:cs typeface="Helvetica"/>
-                <a:sym typeface="Helvetica"/>
-              </a:defRPr>
-            </a:pPr>
-            <a:r>
-              <a:t>Blue Team (CCDC, CDX) </a:t>
-            </a:r>
-          </a:p>
-          <a:p>
-            <a:pPr marL="583406" indent="-583406" defTabSz="457200">
-              <a:lnSpc>
-                <a:spcPts val="9800"/>
-              </a:lnSpc>
-              <a:spcBef>
-                <a:spcPts val="0"/>
-              </a:spcBef>
-              <a:defRPr sz="4200">
-                <a:solidFill>
-                  <a:srgbClr val="222222"/>
-                </a:solidFill>
-                <a:latin typeface="Helvetica"/>
-                <a:ea typeface="Helvetica"/>
-                <a:cs typeface="Helvetica"/>
-                <a:sym typeface="Helvetica"/>
-              </a:defRPr>
-            </a:pPr>
-            <a:r>
-              <a:t>Red Team (Jeopardy, Game-board)</a:t>
-            </a:r>
-          </a:p>
-          <a:p>
-            <a:pPr marL="583406" indent="-583406" defTabSz="457200">
-              <a:lnSpc>
-                <a:spcPts val="9800"/>
-              </a:lnSpc>
-              <a:spcBef>
-                <a:spcPts val="0"/>
-              </a:spcBef>
-              <a:defRPr sz="4200">
-                <a:solidFill>
-                  <a:srgbClr val="222222"/>
-                </a:solidFill>
-                <a:latin typeface="Helvetica"/>
-                <a:ea typeface="Helvetica"/>
-                <a:cs typeface="Helvetica"/>
-                <a:sym typeface="Helvetica"/>
-              </a:defRPr>
-            </a:pPr>
-            <a:r>
-              <a:t>Full Spectrum / Attack-Defense</a:t>
-            </a:r>
-          </a:p>
-          <a:p>
-            <a:pPr marL="583406" indent="-583406" defTabSz="457200">
-              <a:lnSpc>
-                <a:spcPts val="9800"/>
-              </a:lnSpc>
-              <a:spcBef>
-                <a:spcPts val="0"/>
-              </a:spcBef>
-              <a:defRPr sz="4200">
-                <a:solidFill>
-                  <a:srgbClr val="222222"/>
-                </a:solidFill>
-                <a:latin typeface="Helvetica"/>
-                <a:ea typeface="Helvetica"/>
-                <a:cs typeface="Helvetica"/>
-                <a:sym typeface="Helvetica"/>
-              </a:defRPr>
-            </a:pPr>
-            <a:r>
-              <a:t>Social Engineering</a:t>
+            <a:pPr/>
+            <a:r>
+              <a:t>Who has heard of CTF?</a:t>
+            </a:r>
+          </a:p>
+          <a:p>
+            <a:pPr/>
+            <a:r>
+              <a:t>Who has played CTF?</a:t>
             </a:r>
           </a:p>
         </p:txBody>
@@ -4781,7 +5039,7 @@
       </p:grpSpPr>
       <p:sp>
         <p:nvSpPr>
-          <p:cNvPr id="133" name="Why do we play CTF"/>
+          <p:cNvPr id="133" name="Types of CTF"/>
           <p:cNvSpPr txBox="1"/>
           <p:nvPr>
             <p:ph type="title"/>
@@ -4798,14 +5056,14 @@
           <a:p>
             <a:pPr/>
             <a:r>
-              <a:t>Why do we play CTF</a:t>
+              <a:t>Types of CTF</a:t>
             </a:r>
           </a:p>
         </p:txBody>
       </p:sp>
       <p:sp>
         <p:nvSpPr>
-          <p:cNvPr id="134" name="Hone our skills…"/>
+          <p:cNvPr id="134" name="Blue Team (CCDC, CDX)…"/>
           <p:cNvSpPr txBox="1"/>
           <p:nvPr>
             <p:ph type="body" idx="1"/>
@@ -4820,21 +5078,91 @@
           <a:bodyPr/>
           <a:lstStyle/>
           <a:p>
-            <a:pPr/>
-            <a:r>
-              <a:t>Hone our skills</a:t>
-            </a:r>
-          </a:p>
-          <a:p>
-            <a:pPr/>
-            <a:r>
-              <a:t>Develop new skills along the way</a:t>
-            </a:r>
-          </a:p>
-          <a:p>
-            <a:pPr/>
-            <a:r>
-              <a:t>Think about SW in a different way</a:t>
+            <a:pPr marL="583406" indent="-583406" defTabSz="457200">
+              <a:lnSpc>
+                <a:spcPts val="9800"/>
+              </a:lnSpc>
+              <a:spcBef>
+                <a:spcPts val="0"/>
+              </a:spcBef>
+              <a:defRPr sz="4200">
+                <a:solidFill>
+                  <a:srgbClr val="222222"/>
+                </a:solidFill>
+                <a:latin typeface="Helvetica"/>
+                <a:ea typeface="Helvetica"/>
+                <a:cs typeface="Helvetica"/>
+                <a:sym typeface="Helvetica"/>
+              </a:defRPr>
+            </a:pPr>
+            <a:r>
+              <a:t>Blue Team (CCDC, CDX) </a:t>
+            </a:r>
+          </a:p>
+          <a:p>
+            <a:pPr marL="583406" indent="-583406" defTabSz="457200">
+              <a:lnSpc>
+                <a:spcPts val="9800"/>
+              </a:lnSpc>
+              <a:spcBef>
+                <a:spcPts val="0"/>
+              </a:spcBef>
+              <a:defRPr sz="4200">
+                <a:solidFill>
+                  <a:srgbClr val="222222"/>
+                </a:solidFill>
+                <a:latin typeface="Helvetica"/>
+                <a:ea typeface="Helvetica"/>
+                <a:cs typeface="Helvetica"/>
+                <a:sym typeface="Helvetica"/>
+              </a:defRPr>
+            </a:pPr>
+            <a:r>
+              <a:t>Red Team (Jeopardy, Game-board)</a:t>
+            </a:r>
+          </a:p>
+          <a:p>
+            <a:pPr marL="583406" indent="-583406" defTabSz="457200">
+              <a:lnSpc>
+                <a:spcPts val="9800"/>
+              </a:lnSpc>
+              <a:spcBef>
+                <a:spcPts val="0"/>
+              </a:spcBef>
+              <a:defRPr sz="4200">
+                <a:solidFill>
+                  <a:srgbClr val="222222"/>
+                </a:solidFill>
+                <a:latin typeface="Helvetica"/>
+                <a:ea typeface="Helvetica"/>
+                <a:cs typeface="Helvetica"/>
+                <a:sym typeface="Helvetica"/>
+              </a:defRPr>
+            </a:pPr>
+            <a:r>
+              <a:t>Full Spectrum / Attack-Defense</a:t>
+            </a:r>
+          </a:p>
+          <a:p>
+            <a:pPr marL="583406" indent="-583406" defTabSz="457200">
+              <a:lnSpc>
+                <a:spcPts val="9800"/>
+              </a:lnSpc>
+              <a:spcBef>
+                <a:spcPts val="0"/>
+              </a:spcBef>
+              <a:defRPr sz="4200">
+                <a:solidFill>
+                  <a:srgbClr val="222222"/>
+                </a:solidFill>
+                <a:latin typeface="Helvetica"/>
+                <a:ea typeface="Helvetica"/>
+                <a:cs typeface="Helvetica"/>
+                <a:sym typeface="Helvetica"/>
+              </a:defRPr>
+            </a:pPr>
+            <a:r>
+              <a:t>Social Engineering</a:t>
             </a:r>
           </a:p>
         </p:txBody>
@@ -4867,7 +5195,7 @@
       </p:grpSpPr>
       <p:sp>
         <p:nvSpPr>
-          <p:cNvPr id="136" name="What you need to know?"/>
+          <p:cNvPr id="136" name="Why do we play CTF"/>
           <p:cNvSpPr txBox="1"/>
           <p:nvPr>
             <p:ph type="title"/>
@@ -4880,22 +5208,18 @@
         </p:spPr>
         <p:txBody>
           <a:bodyPr/>
-          <a:lstStyle>
-            <a:lvl1pPr defTabSz="484886">
-              <a:defRPr sz="6640"/>
-            </a:lvl1pPr>
-          </a:lstStyle>
-          <a:p>
-            <a:pPr/>
-            <a:r>
-              <a:t>What you need to know?</a:t>
+          <a:lstStyle/>
+          <a:p>
+            <a:pPr/>
+            <a:r>
+              <a:t>Why do we play CTF</a:t>
             </a:r>
           </a:p>
         </p:txBody>
       </p:sp>
       <p:sp>
         <p:nvSpPr>
-          <p:cNvPr id="137" name="Minimally: how to think critically.…"/>
+          <p:cNvPr id="137" name="Hone our skills…"/>
           <p:cNvSpPr txBox="1"/>
           <p:nvPr>
             <p:ph type="body" idx="1"/>
@@ -4912,25 +5236,19 @@
           <a:p>
             <a:pPr/>
             <a:r>
-              <a:t>Minimally: how to think critically. </a:t>
-            </a:r>
-          </a:p>
-          <a:p>
-            <a:pPr/>
-            <a:r>
-              <a:t>Some familiarity with programming will be helpful, but many past participants of picoCTF have played with no programming experience and learned some programming along the way. </a:t>
-            </a:r>
-          </a:p>
-          <a:p>
-            <a:pPr/>
-            <a:r>
-              <a:t>Exposure to Python, HTML, JavaScript, and C (though Java syntax is close enough for this purpose) is ideal, but in no way required.</a:t>
-            </a:r>
-          </a:p>
-          <a:p>
-            <a:pPr/>
-            <a:r>
-              <a:t>CURIOSITY!!!!</a:t>
+              <a:t>Hone our skills</a:t>
+            </a:r>
+          </a:p>
+          <a:p>
+            <a:pPr/>
+            <a:r>
+              <a:t>Develop new skills along the way</a:t>
+            </a:r>
+          </a:p>
+          <a:p>
+            <a:pPr/>
+            <a:r>
+              <a:t>Think about SW in a different way</a:t>
             </a:r>
           </a:p>
         </p:txBody>
@@ -4963,7 +5281,7 @@
       </p:grpSpPr>
       <p:sp>
         <p:nvSpPr>
-          <p:cNvPr id="139" name="What skills might I need to use"/>
+          <p:cNvPr id="139" name="What you need to know?"/>
           <p:cNvSpPr txBox="1"/>
           <p:nvPr>
             <p:ph type="title"/>
@@ -4984,14 +5302,14 @@
           <a:p>
             <a:pPr/>
             <a:r>
-              <a:t>What skills might I need to use</a:t>
+              <a:t>What you need to know?</a:t>
             </a:r>
           </a:p>
         </p:txBody>
       </p:sp>
       <p:sp>
         <p:nvSpPr>
-          <p:cNvPr id="140" name="Reverse-engineering, network sniffing, protocol analysis, system administration, programming, and cryptanalysis are all skills which may be necessary for different problems"/>
+          <p:cNvPr id="140" name="Minimally: how to think critically.…"/>
           <p:cNvSpPr txBox="1"/>
           <p:nvPr>
             <p:ph type="body" idx="1"/>
@@ -5008,7 +5326,25 @@
           <a:p>
             <a:pPr/>
             <a:r>
-              <a:t>Reverse-engineering, network sniffing, protocol analysis, system administration, programming, and cryptanalysis are all skills which may be necessary for different problems </a:t>
+              <a:t>Minimally: how to think critically. </a:t>
+            </a:r>
+          </a:p>
+          <a:p>
+            <a:pPr/>
+            <a:r>
+              <a:t>Some familiarity with programming will be helpful, but many past participants of picoCTF have played with no programming experience and learned some programming along the way. </a:t>
+            </a:r>
+          </a:p>
+          <a:p>
+            <a:pPr/>
+            <a:r>
+              <a:t>Exposure to Python, HTML, JavaScript, and C (though Java syntax is close enough for this purpose) is ideal, but in no way required.</a:t>
+            </a:r>
+          </a:p>
+          <a:p>
+            <a:pPr/>
+            <a:r>
+              <a:t>CURIOSITY!!!!</a:t>
             </a:r>
           </a:p>
         </p:txBody>
@@ -5041,7 +5377,7 @@
       </p:grpSpPr>
       <p:sp>
         <p:nvSpPr>
-          <p:cNvPr id="142" name="Time to get started"/>
+          <p:cNvPr id="142" name="What skills might I need to use"/>
           <p:cNvSpPr txBox="1"/>
           <p:nvPr>
             <p:ph type="title"/>
@@ -5054,11 +5390,39 @@
         </p:spPr>
         <p:txBody>
           <a:bodyPr/>
+          <a:lstStyle>
+            <a:lvl1pPr defTabSz="484886">
+              <a:defRPr sz="6640"/>
+            </a:lvl1pPr>
+          </a:lstStyle>
+          <a:p>
+            <a:pPr/>
+            <a:r>
+              <a:t>What skills might I need to use</a:t>
+            </a:r>
+          </a:p>
+        </p:txBody>
+      </p:sp>
+      <p:sp>
+        <p:nvSpPr>
+          <p:cNvPr id="143" name="Reverse-engineering, network sniffing, protocol analysis, system administration, programming, and cryptanalysis are all skills which may be necessary for different problems"/>
+          <p:cNvSpPr txBox="1"/>
+          <p:nvPr>
+            <p:ph type="body" idx="1"/>
+          </p:nvPr>
+        </p:nvSpPr>
+        <p:spPr>
+          <a:prstGeom prst="rect">
+            <a:avLst/>
+          </a:prstGeom>
+        </p:spPr>
+        <p:txBody>
+          <a:bodyPr/>
           <a:lstStyle/>
           <a:p>
             <a:pPr/>
             <a:r>
-              <a:t>Time to get started</a:t>
+              <a:t>Reverse-engineering, network sniffing, protocol analysis, system administration, programming, and cryptanalysis are all skills which may be necessary for different problems </a:t>
             </a:r>
           </a:p>
         </p:txBody>

</xml_diff>

<commit_message>
Final edition of slides presented.
Added a pdf version
</commit_message>
<xml_diff>
--- a/CTF-101 H4ck3r k1d3rgart3n.pptx
+++ b/CTF-101 H4ck3r k1d3rgart3n.pptx
@@ -35,7 +35,6 @@
     <p:sldId id="280" r:id="rId32"/>
     <p:sldId id="281" r:id="rId33"/>
     <p:sldId id="282" r:id="rId34"/>
-    <p:sldId id="283" r:id="rId35"/>
   </p:sldIdLst>
   <p:sldSz cx="13004800" cy="9753600"/>
   <p:notesSz cx="6858000" cy="9144000"/>
@@ -3411,7 +3410,7 @@
       </p:grpSpPr>
       <p:sp>
         <p:nvSpPr>
-          <p:cNvPr id="156" name="Warm up #1"/>
+          <p:cNvPr id="156" name="Lets figure this one out together"/>
           <p:cNvSpPr txBox="1"/>
           <p:nvPr>
             <p:ph type="title"/>
@@ -3424,11 +3423,15 @@
         </p:spPr>
         <p:txBody>
           <a:bodyPr/>
-          <a:lstStyle/>
-          <a:p>
-            <a:pPr/>
-            <a:r>
-              <a:t>Warm up #1</a:t>
+          <a:lstStyle>
+            <a:lvl1pPr defTabSz="484886">
+              <a:defRPr sz="6640"/>
+            </a:lvl1pPr>
+          </a:lstStyle>
+          <a:p>
+            <a:pPr/>
+            <a:r>
+              <a:t>Lets figure this one out together</a:t>
             </a:r>
           </a:p>
         </p:txBody>
@@ -3451,37 +3454,8 @@
         </p:blipFill>
         <p:spPr>
           <a:xfrm>
-            <a:off x="2078154" y="2769250"/>
-            <a:ext cx="8848492" cy="1810096"/>
-          </a:xfrm>
-          <a:prstGeom prst="rect">
-            <a:avLst/>
-          </a:prstGeom>
-          <a:ln w="12700">
-            <a:miter lim="400000"/>
-          </a:ln>
-        </p:spPr>
-      </p:pic>
-      <p:pic>
-        <p:nvPicPr>
-          <p:cNvPr id="158" name="Image" descr="Image"/>
-          <p:cNvPicPr>
-            <a:picLocks noChangeAspect="1"/>
-          </p:cNvPicPr>
-          <p:nvPr/>
-        </p:nvPicPr>
-        <p:blipFill>
-          <a:blip r:embed="rId3">
-            <a:extLst/>
-          </a:blip>
-          <a:stretch>
-            <a:fillRect/>
-          </a:stretch>
-        </p:blipFill>
-        <p:spPr>
-          <a:xfrm>
-            <a:off x="2058312" y="4935596"/>
-            <a:ext cx="8888176" cy="1609608"/>
+            <a:off x="230741" y="3168705"/>
+            <a:ext cx="12543318" cy="2339516"/>
           </a:xfrm>
           <a:prstGeom prst="rect">
             <a:avLst/>
@@ -3517,37 +3491,9 @@
           <a:chExt cx="0" cy="0"/>
         </a:xfrm>
       </p:grpSpPr>
-      <p:sp>
-        <p:nvSpPr>
-          <p:cNvPr id="160" name="Lets figure this one out together"/>
-          <p:cNvSpPr txBox="1"/>
-          <p:nvPr>
-            <p:ph type="title"/>
-          </p:nvPr>
-        </p:nvSpPr>
-        <p:spPr>
-          <a:prstGeom prst="rect">
-            <a:avLst/>
-          </a:prstGeom>
-        </p:spPr>
-        <p:txBody>
-          <a:bodyPr/>
-          <a:lstStyle>
-            <a:lvl1pPr defTabSz="484886">
-              <a:defRPr sz="6640"/>
-            </a:lvl1pPr>
-          </a:lstStyle>
-          <a:p>
-            <a:pPr/>
-            <a:r>
-              <a:t>Lets figure this one out together</a:t>
-            </a:r>
-          </a:p>
-        </p:txBody>
-      </p:sp>
       <p:pic>
         <p:nvPicPr>
-          <p:cNvPr id="161" name="Image" descr="Image"/>
+          <p:cNvPr id="159" name="Image" descr="Image"/>
           <p:cNvPicPr>
             <a:picLocks noChangeAspect="1"/>
           </p:cNvPicPr>
@@ -3563,8 +3509,8 @@
         </p:blipFill>
         <p:spPr>
           <a:xfrm>
-            <a:off x="230741" y="3168705"/>
-            <a:ext cx="12543318" cy="2339516"/>
+            <a:off x="2882900" y="2559050"/>
+            <a:ext cx="7239000" cy="4635500"/>
           </a:xfrm>
           <a:prstGeom prst="rect">
             <a:avLst/>
@@ -3602,7 +3548,7 @@
       </p:grpSpPr>
       <p:pic>
         <p:nvPicPr>
-          <p:cNvPr id="163" name="Image" descr="Image"/>
+          <p:cNvPr id="161" name="Image" descr="Image"/>
           <p:cNvPicPr>
             <a:picLocks noChangeAspect="1"/>
           </p:cNvPicPr>
@@ -3618,8 +3564,8 @@
         </p:blipFill>
         <p:spPr>
           <a:xfrm>
-            <a:off x="2882900" y="2559050"/>
-            <a:ext cx="7239000" cy="4635500"/>
+            <a:off x="730250" y="3105150"/>
+            <a:ext cx="11544300" cy="3543300"/>
           </a:xfrm>
           <a:prstGeom prst="rect">
             <a:avLst/>
@@ -3655,9 +3601,37 @@
           <a:chExt cx="0" cy="0"/>
         </a:xfrm>
       </p:grpSpPr>
+      <p:sp>
+        <p:nvSpPr>
+          <p:cNvPr id="163" name="Let’s do one more together"/>
+          <p:cNvSpPr txBox="1"/>
+          <p:nvPr>
+            <p:ph type="title"/>
+          </p:nvPr>
+        </p:nvSpPr>
+        <p:spPr>
+          <a:prstGeom prst="rect">
+            <a:avLst/>
+          </a:prstGeom>
+        </p:spPr>
+        <p:txBody>
+          <a:bodyPr/>
+          <a:lstStyle>
+            <a:lvl1pPr defTabSz="502412">
+              <a:defRPr sz="6880"/>
+            </a:lvl1pPr>
+          </a:lstStyle>
+          <a:p>
+            <a:pPr/>
+            <a:r>
+              <a:t>Let’s do one more together</a:t>
+            </a:r>
+          </a:p>
+        </p:txBody>
+      </p:sp>
       <p:pic>
         <p:nvPicPr>
-          <p:cNvPr id="165" name="Image" descr="Image"/>
+          <p:cNvPr id="164" name="Image" descr="Image"/>
           <p:cNvPicPr>
             <a:picLocks noChangeAspect="1"/>
           </p:cNvPicPr>
@@ -3673,8 +3647,37 @@
         </p:blipFill>
         <p:spPr>
           <a:xfrm>
-            <a:off x="730250" y="3105150"/>
-            <a:ext cx="11544300" cy="3543300"/>
+            <a:off x="527509" y="3654543"/>
+            <a:ext cx="11949782" cy="2444514"/>
+          </a:xfrm>
+          <a:prstGeom prst="rect">
+            <a:avLst/>
+          </a:prstGeom>
+          <a:ln w="12700">
+            <a:miter lim="400000"/>
+          </a:ln>
+        </p:spPr>
+      </p:pic>
+      <p:pic>
+        <p:nvPicPr>
+          <p:cNvPr id="165" name="Image" descr="Image"/>
+          <p:cNvPicPr>
+            <a:picLocks noChangeAspect="1"/>
+          </p:cNvPicPr>
+          <p:nvPr/>
+        </p:nvPicPr>
+        <p:blipFill>
+          <a:blip r:embed="rId3">
+            <a:extLst/>
+          </a:blip>
+          <a:stretch>
+            <a:fillRect/>
+          </a:stretch>
+        </p:blipFill>
+        <p:spPr>
+          <a:xfrm>
+            <a:off x="541453" y="6727454"/>
+            <a:ext cx="11921894" cy="2159001"/>
           </a:xfrm>
           <a:prstGeom prst="rect">
             <a:avLst/>
@@ -3710,37 +3713,9 @@
           <a:chExt cx="0" cy="0"/>
         </a:xfrm>
       </p:grpSpPr>
-      <p:sp>
-        <p:nvSpPr>
-          <p:cNvPr id="167" name="Let’s do one more together"/>
-          <p:cNvSpPr txBox="1"/>
-          <p:nvPr>
-            <p:ph type="title"/>
-          </p:nvPr>
-        </p:nvSpPr>
-        <p:spPr>
-          <a:prstGeom prst="rect">
-            <a:avLst/>
-          </a:prstGeom>
-        </p:spPr>
-        <p:txBody>
-          <a:bodyPr/>
-          <a:lstStyle>
-            <a:lvl1pPr defTabSz="502412">
-              <a:defRPr sz="6880"/>
-            </a:lvl1pPr>
-          </a:lstStyle>
-          <a:p>
-            <a:pPr/>
-            <a:r>
-              <a:t>Let’s do one more together</a:t>
-            </a:r>
-          </a:p>
-        </p:txBody>
-      </p:sp>
       <p:pic>
         <p:nvPicPr>
-          <p:cNvPr id="168" name="Image" descr="Image"/>
+          <p:cNvPr id="167" name="Image" descr="Image"/>
           <p:cNvPicPr>
             <a:picLocks noChangeAspect="1"/>
           </p:cNvPicPr>
@@ -3756,37 +3731,8 @@
         </p:blipFill>
         <p:spPr>
           <a:xfrm>
-            <a:off x="527509" y="3654543"/>
-            <a:ext cx="11949782" cy="2444514"/>
-          </a:xfrm>
-          <a:prstGeom prst="rect">
-            <a:avLst/>
-          </a:prstGeom>
-          <a:ln w="12700">
-            <a:miter lim="400000"/>
-          </a:ln>
-        </p:spPr>
-      </p:pic>
-      <p:pic>
-        <p:nvPicPr>
-          <p:cNvPr id="169" name="Image" descr="Image"/>
-          <p:cNvPicPr>
-            <a:picLocks noChangeAspect="1"/>
-          </p:cNvPicPr>
-          <p:nvPr/>
-        </p:nvPicPr>
-        <p:blipFill>
-          <a:blip r:embed="rId3">
-            <a:extLst/>
-          </a:blip>
-          <a:stretch>
-            <a:fillRect/>
-          </a:stretch>
-        </p:blipFill>
-        <p:spPr>
-          <a:xfrm>
-            <a:off x="541453" y="6727454"/>
-            <a:ext cx="11921894" cy="2159001"/>
+            <a:off x="2889250" y="2940050"/>
+            <a:ext cx="7226300" cy="3873500"/>
           </a:xfrm>
           <a:prstGeom prst="rect">
             <a:avLst/>
@@ -3824,7 +3770,7 @@
       </p:grpSpPr>
       <p:pic>
         <p:nvPicPr>
-          <p:cNvPr id="171" name="Image" descr="Image"/>
+          <p:cNvPr id="169" name="Image" descr="Image"/>
           <p:cNvPicPr>
             <a:picLocks noChangeAspect="1"/>
           </p:cNvPicPr>
@@ -3840,8 +3786,8 @@
         </p:blipFill>
         <p:spPr>
           <a:xfrm>
-            <a:off x="2889250" y="2940050"/>
-            <a:ext cx="7226300" cy="3873500"/>
+            <a:off x="2041895" y="148302"/>
+            <a:ext cx="8921010" cy="9456996"/>
           </a:xfrm>
           <a:prstGeom prst="rect">
             <a:avLst/>
@@ -3951,9 +3897,33 @@
           <a:chExt cx="0" cy="0"/>
         </a:xfrm>
       </p:grpSpPr>
+      <p:sp>
+        <p:nvSpPr>
+          <p:cNvPr id="171" name="One more for fun"/>
+          <p:cNvSpPr txBox="1"/>
+          <p:nvPr>
+            <p:ph type="title"/>
+          </p:nvPr>
+        </p:nvSpPr>
+        <p:spPr>
+          <a:prstGeom prst="rect">
+            <a:avLst/>
+          </a:prstGeom>
+        </p:spPr>
+        <p:txBody>
+          <a:bodyPr/>
+          <a:lstStyle/>
+          <a:p>
+            <a:pPr/>
+            <a:r>
+              <a:t>One more for fun</a:t>
+            </a:r>
+          </a:p>
+        </p:txBody>
+      </p:sp>
       <p:pic>
         <p:nvPicPr>
-          <p:cNvPr id="173" name="Image" descr="Image"/>
+          <p:cNvPr id="172" name="Image" descr="Image"/>
           <p:cNvPicPr>
             <a:picLocks noChangeAspect="1"/>
           </p:cNvPicPr>
@@ -3969,8 +3939,8 @@
         </p:blipFill>
         <p:spPr>
           <a:xfrm>
-            <a:off x="2041895" y="148302"/>
-            <a:ext cx="8921010" cy="9456996"/>
+            <a:off x="1091148" y="3742507"/>
+            <a:ext cx="10822504" cy="2014373"/>
           </a:xfrm>
           <a:prstGeom prst="rect">
             <a:avLst/>
@@ -4008,7 +3978,7 @@
       </p:grpSpPr>
       <p:sp>
         <p:nvSpPr>
-          <p:cNvPr id="175" name="One more for fun"/>
+          <p:cNvPr id="174" name="OSINT"/>
           <p:cNvSpPr txBox="1"/>
           <p:nvPr>
             <p:ph type="title"/>
@@ -4025,8 +3995,29 @@
           <a:p>
             <a:pPr/>
             <a:r>
-              <a:t>One more for fun</a:t>
-            </a:r>
+              <a:t>OSINT</a:t>
+            </a:r>
+          </a:p>
+        </p:txBody>
+      </p:sp>
+      <p:sp>
+        <p:nvSpPr>
+          <p:cNvPr id="175" name="Body"/>
+          <p:cNvSpPr txBox="1"/>
+          <p:nvPr>
+            <p:ph type="body" idx="1"/>
+          </p:nvPr>
+        </p:nvSpPr>
+        <p:spPr>
+          <a:prstGeom prst="rect">
+            <a:avLst/>
+          </a:prstGeom>
+        </p:spPr>
+        <p:txBody>
+          <a:bodyPr/>
+          <a:lstStyle/>
+          <a:p>
+            <a:pPr/>
           </a:p>
         </p:txBody>
       </p:sp>
@@ -4048,8 +4039,8 @@
         </p:blipFill>
         <p:spPr>
           <a:xfrm>
-            <a:off x="1091148" y="3742507"/>
-            <a:ext cx="10822504" cy="2014373"/>
+            <a:off x="1308100" y="2679700"/>
+            <a:ext cx="10388600" cy="4394200"/>
           </a:xfrm>
           <a:prstGeom prst="rect">
             <a:avLst/>
@@ -4087,7 +4078,7 @@
       </p:grpSpPr>
       <p:sp>
         <p:nvSpPr>
-          <p:cNvPr id="178" name="OSINT"/>
+          <p:cNvPr id="178" name="Title"/>
           <p:cNvSpPr txBox="1"/>
           <p:nvPr>
             <p:ph type="title"/>
@@ -4103,9 +4094,6 @@
           <a:lstStyle/>
           <a:p>
             <a:pPr/>
-            <a:r>
-              <a:t>OSINT</a:t>
-            </a:r>
           </a:p>
         </p:txBody>
       </p:sp>
@@ -4148,8 +4136,8 @@
         </p:blipFill>
         <p:spPr>
           <a:xfrm>
-            <a:off x="1308100" y="2679700"/>
-            <a:ext cx="10388600" cy="4394200"/>
+            <a:off x="685412" y="984250"/>
+            <a:ext cx="11887977" cy="9753600"/>
           </a:xfrm>
           <a:prstGeom prst="rect">
             <a:avLst/>
@@ -4187,7 +4175,7 @@
       </p:grpSpPr>
       <p:sp>
         <p:nvSpPr>
-          <p:cNvPr id="182" name="Title"/>
+          <p:cNvPr id="182" name="Can anyone give me another way"/>
           <p:cNvSpPr txBox="1"/>
           <p:nvPr>
             <p:ph type="title"/>
@@ -4200,62 +4188,19 @@
         </p:spPr>
         <p:txBody>
           <a:bodyPr/>
-          <a:lstStyle/>
-          <a:p>
-            <a:pPr/>
+          <a:lstStyle>
+            <a:lvl1pPr defTabSz="484886">
+              <a:defRPr sz="6640"/>
+            </a:lvl1pPr>
+          </a:lstStyle>
+          <a:p>
+            <a:pPr/>
+            <a:r>
+              <a:t>Can anyone give me another way</a:t>
+            </a:r>
           </a:p>
         </p:txBody>
       </p:sp>
-      <p:sp>
-        <p:nvSpPr>
-          <p:cNvPr id="183" name="Body"/>
-          <p:cNvSpPr txBox="1"/>
-          <p:nvPr>
-            <p:ph type="body" idx="1"/>
-          </p:nvPr>
-        </p:nvSpPr>
-        <p:spPr>
-          <a:prstGeom prst="rect">
-            <a:avLst/>
-          </a:prstGeom>
-        </p:spPr>
-        <p:txBody>
-          <a:bodyPr/>
-          <a:lstStyle/>
-          <a:p>
-            <a:pPr/>
-          </a:p>
-        </p:txBody>
-      </p:sp>
-      <p:pic>
-        <p:nvPicPr>
-          <p:cNvPr id="184" name="Image" descr="Image"/>
-          <p:cNvPicPr>
-            <a:picLocks noChangeAspect="1"/>
-          </p:cNvPicPr>
-          <p:nvPr/>
-        </p:nvPicPr>
-        <p:blipFill>
-          <a:blip r:embed="rId2">
-            <a:extLst/>
-          </a:blip>
-          <a:stretch>
-            <a:fillRect/>
-          </a:stretch>
-        </p:blipFill>
-        <p:spPr>
-          <a:xfrm>
-            <a:off x="685412" y="984250"/>
-            <a:ext cx="11887977" cy="9753600"/>
-          </a:xfrm>
-          <a:prstGeom prst="rect">
-            <a:avLst/>
-          </a:prstGeom>
-          <a:ln w="12700">
-            <a:miter lim="400000"/>
-          </a:ln>
-        </p:spPr>
-      </p:pic>
     </p:spTree>
   </p:cSld>
   <p:clrMapOvr>
@@ -4284,7 +4229,7 @@
       </p:grpSpPr>
       <p:sp>
         <p:nvSpPr>
-          <p:cNvPr id="186" name="Can anyone give me another way"/>
+          <p:cNvPr id="184" name="How About Python"/>
           <p:cNvSpPr txBox="1"/>
           <p:nvPr>
             <p:ph type="title"/>
@@ -4297,19 +4242,44 @@
         </p:spPr>
         <p:txBody>
           <a:bodyPr/>
-          <a:lstStyle>
-            <a:lvl1pPr defTabSz="484886">
-              <a:defRPr sz="6640"/>
-            </a:lvl1pPr>
-          </a:lstStyle>
-          <a:p>
-            <a:pPr/>
-            <a:r>
-              <a:t>Can anyone give me another way</a:t>
+          <a:lstStyle/>
+          <a:p>
+            <a:pPr/>
+            <a:r>
+              <a:t>How About Python</a:t>
             </a:r>
           </a:p>
         </p:txBody>
       </p:sp>
+      <p:pic>
+        <p:nvPicPr>
+          <p:cNvPr id="185" name="Image" descr="Image"/>
+          <p:cNvPicPr>
+            <a:picLocks noChangeAspect="1"/>
+          </p:cNvPicPr>
+          <p:nvPr/>
+        </p:nvPicPr>
+        <p:blipFill>
+          <a:blip r:embed="rId2">
+            <a:extLst/>
+          </a:blip>
+          <a:stretch>
+            <a:fillRect/>
+          </a:stretch>
+        </p:blipFill>
+        <p:spPr>
+          <a:xfrm>
+            <a:off x="2452144" y="3146815"/>
+            <a:ext cx="8100512" cy="5187170"/>
+          </a:xfrm>
+          <a:prstGeom prst="rect">
+            <a:avLst/>
+          </a:prstGeom>
+          <a:ln w="12700">
+            <a:miter lim="400000"/>
+          </a:ln>
+        </p:spPr>
+      </p:pic>
     </p:spTree>
   </p:cSld>
   <p:clrMapOvr>
@@ -4338,13 +4308,17 @@
       </p:grpSpPr>
       <p:sp>
         <p:nvSpPr>
-          <p:cNvPr id="188" name="How About Python"/>
+          <p:cNvPr id="187" name="Any others"/>
           <p:cNvSpPr txBox="1"/>
           <p:nvPr>
             <p:ph type="title"/>
           </p:nvPr>
         </p:nvSpPr>
         <p:spPr>
+          <a:xfrm>
+            <a:off x="952500" y="3797300"/>
+            <a:ext cx="11099800" cy="2159000"/>
+          </a:xfrm>
           <a:prstGeom prst="rect">
             <a:avLst/>
           </a:prstGeom>
@@ -4355,40 +4329,11 @@
           <a:p>
             <a:pPr/>
             <a:r>
-              <a:t>How About Python</a:t>
+              <a:t>Any others</a:t>
             </a:r>
           </a:p>
         </p:txBody>
       </p:sp>
-      <p:pic>
-        <p:nvPicPr>
-          <p:cNvPr id="189" name="Image" descr="Image"/>
-          <p:cNvPicPr>
-            <a:picLocks noChangeAspect="1"/>
-          </p:cNvPicPr>
-          <p:nvPr/>
-        </p:nvPicPr>
-        <p:blipFill>
-          <a:blip r:embed="rId2">
-            <a:extLst/>
-          </a:blip>
-          <a:stretch>
-            <a:fillRect/>
-          </a:stretch>
-        </p:blipFill>
-        <p:spPr>
-          <a:xfrm>
-            <a:off x="2452144" y="3146815"/>
-            <a:ext cx="8100512" cy="5187170"/>
-          </a:xfrm>
-          <a:prstGeom prst="rect">
-            <a:avLst/>
-          </a:prstGeom>
-          <a:ln w="12700">
-            <a:miter lim="400000"/>
-          </a:ln>
-        </p:spPr>
-      </p:pic>
     </p:spTree>
   </p:cSld>
   <p:clrMapOvr>
@@ -4417,17 +4362,13 @@
       </p:grpSpPr>
       <p:sp>
         <p:nvSpPr>
-          <p:cNvPr id="191" name="Any others"/>
+          <p:cNvPr id="189" name="Additional resources"/>
           <p:cNvSpPr txBox="1"/>
           <p:nvPr>
             <p:ph type="title"/>
           </p:nvPr>
         </p:nvSpPr>
         <p:spPr>
-          <a:xfrm>
-            <a:off x="952500" y="3797300"/>
-            <a:ext cx="11099800" cy="2159000"/>
-          </a:xfrm>
           <a:prstGeom prst="rect">
             <a:avLst/>
           </a:prstGeom>
@@ -4438,7 +4379,43 @@
           <a:p>
             <a:pPr/>
             <a:r>
-              <a:t>Any others</a:t>
+              <a:t>Additional resources</a:t>
+            </a:r>
+          </a:p>
+        </p:txBody>
+      </p:sp>
+      <p:sp>
+        <p:nvSpPr>
+          <p:cNvPr id="190" name="Youtube…"/>
+          <p:cNvSpPr txBox="1"/>
+          <p:nvPr>
+            <p:ph type="body" idx="1"/>
+          </p:nvPr>
+        </p:nvSpPr>
+        <p:spPr>
+          <a:prstGeom prst="rect">
+            <a:avLst/>
+          </a:prstGeom>
+        </p:spPr>
+        <p:txBody>
+          <a:bodyPr/>
+          <a:lstStyle/>
+          <a:p>
+            <a:pPr/>
+            <a:r>
+              <a:t>Youtube</a:t>
+            </a:r>
+          </a:p>
+          <a:p>
+            <a:pPr/>
+            <a:r>
+              <a:t>Ian Coldwater </a:t>
+            </a:r>
+            <a:r>
+              <a:rPr u="sng">
+                <a:hlinkClick r:id="rId2" invalidUrl="" action="" tgtFrame="" tooltip="" history="1" highlightClick="0" endSnd="0"/>
+              </a:rPr>
+              <a:t>@IanColdwater</a:t>
             </a:r>
           </a:p>
         </p:txBody>
@@ -4471,7 +4448,7 @@
       </p:grpSpPr>
       <p:sp>
         <p:nvSpPr>
-          <p:cNvPr id="193" name="Additional resources"/>
+          <p:cNvPr id="192" name="That’s it…"/>
           <p:cNvSpPr txBox="1"/>
           <p:nvPr>
             <p:ph type="title"/>
@@ -4488,112 +4465,26 @@
           <a:p>
             <a:pPr/>
             <a:r>
-              <a:t>Additional resources</a:t>
+              <a:t>That’s it</a:t>
+            </a:r>
+          </a:p>
+          <a:p>
+            <a:pPr/>
+            <a:r>
+              <a:t>Go have fun now</a:t>
             </a:r>
           </a:p>
         </p:txBody>
       </p:sp>
       <p:sp>
         <p:nvSpPr>
-          <p:cNvPr id="194" name="Youtube…"/>
-          <p:cNvSpPr txBox="1"/>
-          <p:nvPr>
-            <p:ph type="body" idx="1"/>
-          </p:nvPr>
-        </p:nvSpPr>
-        <p:spPr>
-          <a:prstGeom prst="rect">
-            <a:avLst/>
-          </a:prstGeom>
-        </p:spPr>
-        <p:txBody>
-          <a:bodyPr/>
-          <a:lstStyle/>
-          <a:p>
-            <a:pPr/>
-            <a:r>
-              <a:t>Youtube</a:t>
-            </a:r>
-          </a:p>
-          <a:p>
-            <a:pPr/>
-            <a:r>
-              <a:t>Ian Coldwater </a:t>
-            </a:r>
-            <a:r>
-              <a:rPr u="sng">
-                <a:hlinkClick r:id="rId2" invalidUrl="" action="" tgtFrame="" tooltip="" history="1" highlightClick="0" endSnd="0"/>
-              </a:rPr>
-              <a:t>@IanColdwater</a:t>
-            </a:r>
-          </a:p>
-        </p:txBody>
-      </p:sp>
-    </p:spTree>
-  </p:cSld>
-  <p:clrMapOvr>
-    <a:masterClrMapping/>
-  </p:clrMapOvr>
-  <p:transition xmlns:p14="http://schemas.microsoft.com/office/powerpoint/2010/main" spd="med" advClick="1"/>
-</p:sld>
-</file>
-
-<file path=ppt/slides/slide28.xml><?xml version="1.0" encoding="utf-8"?>
-<p:sld xmlns:a="http://schemas.openxmlformats.org/drawingml/2006/main" xmlns:r="http://schemas.openxmlformats.org/officeDocument/2006/relationships" xmlns:p="http://schemas.openxmlformats.org/presentationml/2006/main" xmlns:m="http://schemas.openxmlformats.org/officeDocument/2006/math" xmlns:a14="http://schemas.microsoft.com/office/drawing/2010/main" showMasterSp="1" showMasterPhAnim="1">
-  <p:cSld>
-    <p:spTree>
-      <p:nvGrpSpPr>
-        <p:cNvPr id="1" name=""/>
-        <p:cNvGrpSpPr/>
-        <p:nvPr/>
-      </p:nvGrpSpPr>
-      <p:grpSpPr>
-        <a:xfrm>
-          <a:off x="0" y="0"/>
-          <a:ext cx="0" cy="0"/>
-          <a:chOff x="0" y="0"/>
-          <a:chExt cx="0" cy="0"/>
-        </a:xfrm>
-      </p:grpSpPr>
-      <p:sp>
-        <p:nvSpPr>
-          <p:cNvPr id="196" name="That’s all there is to it…"/>
-          <p:cNvSpPr txBox="1"/>
-          <p:nvPr>
-            <p:ph type="title"/>
-          </p:nvPr>
-        </p:nvSpPr>
-        <p:spPr>
-          <a:prstGeom prst="rect">
-            <a:avLst/>
-          </a:prstGeom>
-        </p:spPr>
-        <p:txBody>
-          <a:bodyPr/>
-          <a:lstStyle/>
-          <a:p>
-            <a:pPr/>
-            <a:r>
-              <a:t>That’s all there is to it</a:t>
-            </a:r>
-          </a:p>
-          <a:p>
-            <a:pPr/>
-            <a:r>
-              <a:t>Go have fun now</a:t>
-            </a:r>
-          </a:p>
-        </p:txBody>
-      </p:sp>
-      <p:sp>
-        <p:nvSpPr>
-          <p:cNvPr id="197" name="Miki Demeter…"/>
+          <p:cNvPr id="193" name="Miki Demeter…"/>
           <p:cNvSpPr txBox="1"/>
           <p:nvPr/>
         </p:nvSpPr>
         <p:spPr>
           <a:xfrm>
-            <a:off x="184353" y="677520"/>
+            <a:off x="184353" y="334620"/>
             <a:ext cx="6692494" cy="2302560"/>
           </a:xfrm>
           <a:prstGeom prst="rect">
@@ -4668,13 +4559,13 @@
       </p:sp>
       <p:sp>
         <p:nvSpPr>
-          <p:cNvPr id="198" name="Stacy Watts…"/>
+          <p:cNvPr id="194" name="Stacy Watts…"/>
           <p:cNvSpPr txBox="1"/>
           <p:nvPr/>
         </p:nvSpPr>
         <p:spPr>
           <a:xfrm>
-            <a:off x="5296103" y="6773520"/>
+            <a:off x="5296103" y="7091020"/>
             <a:ext cx="7416394" cy="2302560"/>
           </a:xfrm>
           <a:prstGeom prst="rect">

</xml_diff>